<commit_message>
PPTX export: save SmartArt as diagram instead of group of shapes
preserving SmartArt allows editing it in PowerPoint after saving as pptx file

* moved common parts for docx and pptx export to oox/drawingml
* fixed export tests that expected shapes on output

Change-Id: I3e70a9f4177bebf5e1671232f4cd0ef0e7212626
</commit_message>
<xml_diff>
--- a/sd/qa/unit/data/pptx/smartart-rotation2.pptx
+++ b/sd/qa/unit/data/pptx/smartart-rotation2.pptx
@@ -116,2680 +116,6 @@
 <p1510:revInfo xmlns:a="http://schemas.openxmlformats.org/drawingml/2006/main" xmlns:r="http://schemas.openxmlformats.org/officeDocument/2006/relationships" xmlns:p1510="http://schemas.microsoft.com/office/powerpoint/2015/10/main"/>
 </file>
 
-<file path=ppt/diagrams/colors1.xml><?xml version="1.0" encoding="utf-8"?>
-<dgm:colorsDef xmlns:dgm="http://schemas.openxmlformats.org/drawingml/2006/diagram" xmlns:a="http://schemas.openxmlformats.org/drawingml/2006/main" uniqueId="urn:microsoft.com/office/officeart/2005/8/colors/accent1_2">
-  <dgm:title val=""/>
-  <dgm:desc val=""/>
-  <dgm:catLst>
-    <dgm:cat type="accent1" pri="11200"/>
-  </dgm:catLst>
-  <dgm:styleLbl name="node0">
-    <dgm:fillClrLst meth="repeat">
-      <a:schemeClr val="accent1"/>
-    </dgm:fillClrLst>
-    <dgm:linClrLst meth="repeat">
-      <a:schemeClr val="lt1"/>
-    </dgm:linClrLst>
-    <dgm:effectClrLst/>
-    <dgm:txLinClrLst/>
-    <dgm:txFillClrLst/>
-    <dgm:txEffectClrLst/>
-  </dgm:styleLbl>
-  <dgm:styleLbl name="alignNode1">
-    <dgm:fillClrLst meth="repeat">
-      <a:schemeClr val="accent1"/>
-    </dgm:fillClrLst>
-    <dgm:linClrLst meth="repeat">
-      <a:schemeClr val="accent1"/>
-    </dgm:linClrLst>
-    <dgm:effectClrLst/>
-    <dgm:txLinClrLst/>
-    <dgm:txFillClrLst/>
-    <dgm:txEffectClrLst/>
-  </dgm:styleLbl>
-  <dgm:styleLbl name="node1">
-    <dgm:fillClrLst meth="repeat">
-      <a:schemeClr val="accent1"/>
-    </dgm:fillClrLst>
-    <dgm:linClrLst meth="repeat">
-      <a:schemeClr val="lt1"/>
-    </dgm:linClrLst>
-    <dgm:effectClrLst/>
-    <dgm:txLinClrLst/>
-    <dgm:txFillClrLst/>
-    <dgm:txEffectClrLst/>
-  </dgm:styleLbl>
-  <dgm:styleLbl name="lnNode1">
-    <dgm:fillClrLst meth="repeat">
-      <a:schemeClr val="accent1"/>
-    </dgm:fillClrLst>
-    <dgm:linClrLst meth="repeat">
-      <a:schemeClr val="lt1"/>
-    </dgm:linClrLst>
-    <dgm:effectClrLst/>
-    <dgm:txLinClrLst/>
-    <dgm:txFillClrLst/>
-    <dgm:txEffectClrLst/>
-  </dgm:styleLbl>
-  <dgm:styleLbl name="vennNode1">
-    <dgm:fillClrLst meth="repeat">
-      <a:schemeClr val="accent1">
-        <a:alpha val="50000"/>
-      </a:schemeClr>
-    </dgm:fillClrLst>
-    <dgm:linClrLst meth="repeat">
-      <a:schemeClr val="lt1"/>
-    </dgm:linClrLst>
-    <dgm:effectClrLst/>
-    <dgm:txLinClrLst/>
-    <dgm:txFillClrLst/>
-    <dgm:txEffectClrLst/>
-  </dgm:styleLbl>
-  <dgm:styleLbl name="node2">
-    <dgm:fillClrLst meth="repeat">
-      <a:schemeClr val="accent1"/>
-    </dgm:fillClrLst>
-    <dgm:linClrLst meth="repeat">
-      <a:schemeClr val="lt1"/>
-    </dgm:linClrLst>
-    <dgm:effectClrLst/>
-    <dgm:txLinClrLst/>
-    <dgm:txFillClrLst/>
-    <dgm:txEffectClrLst/>
-  </dgm:styleLbl>
-  <dgm:styleLbl name="node3">
-    <dgm:fillClrLst meth="repeat">
-      <a:schemeClr val="accent1"/>
-    </dgm:fillClrLst>
-    <dgm:linClrLst meth="repeat">
-      <a:schemeClr val="lt1"/>
-    </dgm:linClrLst>
-    <dgm:effectClrLst/>
-    <dgm:txLinClrLst/>
-    <dgm:txFillClrLst/>
-    <dgm:txEffectClrLst/>
-  </dgm:styleLbl>
-  <dgm:styleLbl name="node4">
-    <dgm:fillClrLst meth="repeat">
-      <a:schemeClr val="accent1"/>
-    </dgm:fillClrLst>
-    <dgm:linClrLst meth="repeat">
-      <a:schemeClr val="lt1"/>
-    </dgm:linClrLst>
-    <dgm:effectClrLst/>
-    <dgm:txLinClrLst/>
-    <dgm:txFillClrLst/>
-    <dgm:txEffectClrLst/>
-  </dgm:styleLbl>
-  <dgm:styleLbl name="fgImgPlace1">
-    <dgm:fillClrLst meth="repeat">
-      <a:schemeClr val="accent1">
-        <a:tint val="50000"/>
-      </a:schemeClr>
-    </dgm:fillClrLst>
-    <dgm:linClrLst meth="repeat">
-      <a:schemeClr val="lt1"/>
-    </dgm:linClrLst>
-    <dgm:effectClrLst/>
-    <dgm:txLinClrLst/>
-    <dgm:txFillClrLst meth="repeat">
-      <a:schemeClr val="lt1"/>
-    </dgm:txFillClrLst>
-    <dgm:txEffectClrLst/>
-  </dgm:styleLbl>
-  <dgm:styleLbl name="alignImgPlace1">
-    <dgm:fillClrLst meth="repeat">
-      <a:schemeClr val="accent1">
-        <a:tint val="50000"/>
-      </a:schemeClr>
-    </dgm:fillClrLst>
-    <dgm:linClrLst meth="repeat">
-      <a:schemeClr val="lt1"/>
-    </dgm:linClrLst>
-    <dgm:effectClrLst/>
-    <dgm:txLinClrLst/>
-    <dgm:txFillClrLst meth="repeat">
-      <a:schemeClr val="lt1"/>
-    </dgm:txFillClrLst>
-    <dgm:txEffectClrLst/>
-  </dgm:styleLbl>
-  <dgm:styleLbl name="bgImgPlace1">
-    <dgm:fillClrLst meth="repeat">
-      <a:schemeClr val="accent1">
-        <a:tint val="50000"/>
-      </a:schemeClr>
-    </dgm:fillClrLst>
-    <dgm:linClrLst meth="repeat">
-      <a:schemeClr val="lt1"/>
-    </dgm:linClrLst>
-    <dgm:effectClrLst/>
-    <dgm:txLinClrLst/>
-    <dgm:txFillClrLst meth="repeat">
-      <a:schemeClr val="lt1"/>
-    </dgm:txFillClrLst>
-    <dgm:txEffectClrLst/>
-  </dgm:styleLbl>
-  <dgm:styleLbl name="sibTrans2D1">
-    <dgm:fillClrLst meth="repeat">
-      <a:schemeClr val="accent1">
-        <a:tint val="60000"/>
-      </a:schemeClr>
-    </dgm:fillClrLst>
-    <dgm:linClrLst meth="repeat">
-      <a:schemeClr val="accent1">
-        <a:tint val="60000"/>
-      </a:schemeClr>
-    </dgm:linClrLst>
-    <dgm:effectClrLst/>
-    <dgm:txLinClrLst/>
-    <dgm:txFillClrLst/>
-    <dgm:txEffectClrLst/>
-  </dgm:styleLbl>
-  <dgm:styleLbl name="fgSibTrans2D1">
-    <dgm:fillClrLst meth="repeat">
-      <a:schemeClr val="accent1">
-        <a:tint val="60000"/>
-      </a:schemeClr>
-    </dgm:fillClrLst>
-    <dgm:linClrLst meth="repeat">
-      <a:schemeClr val="accent1">
-        <a:tint val="60000"/>
-      </a:schemeClr>
-    </dgm:linClrLst>
-    <dgm:effectClrLst/>
-    <dgm:txLinClrLst/>
-    <dgm:txFillClrLst/>
-    <dgm:txEffectClrLst/>
-  </dgm:styleLbl>
-  <dgm:styleLbl name="bgSibTrans2D1">
-    <dgm:fillClrLst meth="repeat">
-      <a:schemeClr val="accent1">
-        <a:tint val="60000"/>
-      </a:schemeClr>
-    </dgm:fillClrLst>
-    <dgm:linClrLst meth="repeat">
-      <a:schemeClr val="accent1">
-        <a:tint val="60000"/>
-      </a:schemeClr>
-    </dgm:linClrLst>
-    <dgm:effectClrLst/>
-    <dgm:txLinClrLst/>
-    <dgm:txFillClrLst/>
-    <dgm:txEffectClrLst/>
-  </dgm:styleLbl>
-  <dgm:styleLbl name="sibTrans1D1">
-    <dgm:fillClrLst meth="repeat">
-      <a:schemeClr val="accent1"/>
-    </dgm:fillClrLst>
-    <dgm:linClrLst meth="repeat">
-      <a:schemeClr val="accent1"/>
-    </dgm:linClrLst>
-    <dgm:effectClrLst/>
-    <dgm:txLinClrLst/>
-    <dgm:txFillClrLst meth="repeat">
-      <a:schemeClr val="tx1"/>
-    </dgm:txFillClrLst>
-    <dgm:txEffectClrLst/>
-  </dgm:styleLbl>
-  <dgm:styleLbl name="callout">
-    <dgm:fillClrLst meth="repeat">
-      <a:schemeClr val="accent1"/>
-    </dgm:fillClrLst>
-    <dgm:linClrLst meth="repeat">
-      <a:schemeClr val="accent1">
-        <a:tint val="50000"/>
-      </a:schemeClr>
-    </dgm:linClrLst>
-    <dgm:effectClrLst/>
-    <dgm:txLinClrLst/>
-    <dgm:txFillClrLst meth="repeat">
-      <a:schemeClr val="tx1"/>
-    </dgm:txFillClrLst>
-    <dgm:txEffectClrLst/>
-  </dgm:styleLbl>
-  <dgm:styleLbl name="asst0">
-    <dgm:fillClrLst meth="repeat">
-      <a:schemeClr val="accent1"/>
-    </dgm:fillClrLst>
-    <dgm:linClrLst meth="repeat">
-      <a:schemeClr val="lt1"/>
-    </dgm:linClrLst>
-    <dgm:effectClrLst/>
-    <dgm:txLinClrLst/>
-    <dgm:txFillClrLst/>
-    <dgm:txEffectClrLst/>
-  </dgm:styleLbl>
-  <dgm:styleLbl name="asst1">
-    <dgm:fillClrLst meth="repeat">
-      <a:schemeClr val="accent1"/>
-    </dgm:fillClrLst>
-    <dgm:linClrLst meth="repeat">
-      <a:schemeClr val="lt1"/>
-    </dgm:linClrLst>
-    <dgm:effectClrLst/>
-    <dgm:txLinClrLst/>
-    <dgm:txFillClrLst/>
-    <dgm:txEffectClrLst/>
-  </dgm:styleLbl>
-  <dgm:styleLbl name="asst2">
-    <dgm:fillClrLst meth="repeat">
-      <a:schemeClr val="accent1"/>
-    </dgm:fillClrLst>
-    <dgm:linClrLst meth="repeat">
-      <a:schemeClr val="lt1"/>
-    </dgm:linClrLst>
-    <dgm:effectClrLst/>
-    <dgm:txLinClrLst/>
-    <dgm:txFillClrLst/>
-    <dgm:txEffectClrLst/>
-  </dgm:styleLbl>
-  <dgm:styleLbl name="asst3">
-    <dgm:fillClrLst meth="repeat">
-      <a:schemeClr val="accent1"/>
-    </dgm:fillClrLst>
-    <dgm:linClrLst meth="repeat">
-      <a:schemeClr val="lt1"/>
-    </dgm:linClrLst>
-    <dgm:effectClrLst/>
-    <dgm:txLinClrLst/>
-    <dgm:txFillClrLst/>
-    <dgm:txEffectClrLst/>
-  </dgm:styleLbl>
-  <dgm:styleLbl name="asst4">
-    <dgm:fillClrLst meth="repeat">
-      <a:schemeClr val="accent1"/>
-    </dgm:fillClrLst>
-    <dgm:linClrLst meth="repeat">
-      <a:schemeClr val="lt1"/>
-    </dgm:linClrLst>
-    <dgm:effectClrLst/>
-    <dgm:txLinClrLst/>
-    <dgm:txFillClrLst/>
-    <dgm:txEffectClrLst/>
-  </dgm:styleLbl>
-  <dgm:styleLbl name="parChTrans2D1">
-    <dgm:fillClrLst meth="repeat">
-      <a:schemeClr val="accent1">
-        <a:tint val="60000"/>
-      </a:schemeClr>
-    </dgm:fillClrLst>
-    <dgm:linClrLst meth="repeat">
-      <a:schemeClr val="accent1">
-        <a:tint val="60000"/>
-      </a:schemeClr>
-    </dgm:linClrLst>
-    <dgm:effectClrLst/>
-    <dgm:txLinClrLst/>
-    <dgm:txFillClrLst meth="repeat">
-      <a:schemeClr val="lt1"/>
-    </dgm:txFillClrLst>
-    <dgm:txEffectClrLst/>
-  </dgm:styleLbl>
-  <dgm:styleLbl name="parChTrans2D2">
-    <dgm:fillClrLst meth="repeat">
-      <a:schemeClr val="accent1"/>
-    </dgm:fillClrLst>
-    <dgm:linClrLst meth="repeat">
-      <a:schemeClr val="accent1"/>
-    </dgm:linClrLst>
-    <dgm:effectClrLst/>
-    <dgm:txLinClrLst/>
-    <dgm:txFillClrLst meth="repeat">
-      <a:schemeClr val="lt1"/>
-    </dgm:txFillClrLst>
-    <dgm:txEffectClrLst/>
-  </dgm:styleLbl>
-  <dgm:styleLbl name="parChTrans2D3">
-    <dgm:fillClrLst meth="repeat">
-      <a:schemeClr val="accent1"/>
-    </dgm:fillClrLst>
-    <dgm:linClrLst meth="repeat">
-      <a:schemeClr val="accent1"/>
-    </dgm:linClrLst>
-    <dgm:effectClrLst/>
-    <dgm:txLinClrLst/>
-    <dgm:txFillClrLst meth="repeat">
-      <a:schemeClr val="lt1"/>
-    </dgm:txFillClrLst>
-    <dgm:txEffectClrLst/>
-  </dgm:styleLbl>
-  <dgm:styleLbl name="parChTrans2D4">
-    <dgm:fillClrLst meth="repeat">
-      <a:schemeClr val="accent1"/>
-    </dgm:fillClrLst>
-    <dgm:linClrLst meth="repeat">
-      <a:schemeClr val="accent1"/>
-    </dgm:linClrLst>
-    <dgm:effectClrLst/>
-    <dgm:txLinClrLst/>
-    <dgm:txFillClrLst meth="repeat">
-      <a:schemeClr val="lt1"/>
-    </dgm:txFillClrLst>
-    <dgm:txEffectClrLst/>
-  </dgm:styleLbl>
-  <dgm:styleLbl name="parChTrans1D1">
-    <dgm:fillClrLst meth="repeat">
-      <a:schemeClr val="accent1"/>
-    </dgm:fillClrLst>
-    <dgm:linClrLst meth="repeat">
-      <a:schemeClr val="accent1">
-        <a:shade val="60000"/>
-      </a:schemeClr>
-    </dgm:linClrLst>
-    <dgm:effectClrLst/>
-    <dgm:txLinClrLst/>
-    <dgm:txFillClrLst meth="repeat">
-      <a:schemeClr val="tx1"/>
-    </dgm:txFillClrLst>
-    <dgm:txEffectClrLst/>
-  </dgm:styleLbl>
-  <dgm:styleLbl name="parChTrans1D2">
-    <dgm:fillClrLst meth="repeat">
-      <a:schemeClr val="accent1"/>
-    </dgm:fillClrLst>
-    <dgm:linClrLst meth="repeat">
-      <a:schemeClr val="accent1">
-        <a:shade val="60000"/>
-      </a:schemeClr>
-    </dgm:linClrLst>
-    <dgm:effectClrLst/>
-    <dgm:txLinClrLst/>
-    <dgm:txFillClrLst meth="repeat">
-      <a:schemeClr val="tx1"/>
-    </dgm:txFillClrLst>
-    <dgm:txEffectClrLst/>
-  </dgm:styleLbl>
-  <dgm:styleLbl name="parChTrans1D3">
-    <dgm:fillClrLst meth="repeat">
-      <a:schemeClr val="accent1"/>
-    </dgm:fillClrLst>
-    <dgm:linClrLst meth="repeat">
-      <a:schemeClr val="accent1">
-        <a:shade val="80000"/>
-      </a:schemeClr>
-    </dgm:linClrLst>
-    <dgm:effectClrLst/>
-    <dgm:txLinClrLst/>
-    <dgm:txFillClrLst meth="repeat">
-      <a:schemeClr val="tx1"/>
-    </dgm:txFillClrLst>
-    <dgm:txEffectClrLst/>
-  </dgm:styleLbl>
-  <dgm:styleLbl name="parChTrans1D4">
-    <dgm:fillClrLst meth="repeat">
-      <a:schemeClr val="accent1"/>
-    </dgm:fillClrLst>
-    <dgm:linClrLst meth="repeat">
-      <a:schemeClr val="accent1">
-        <a:shade val="80000"/>
-      </a:schemeClr>
-    </dgm:linClrLst>
-    <dgm:effectClrLst/>
-    <dgm:txLinClrLst/>
-    <dgm:txFillClrLst meth="repeat">
-      <a:schemeClr val="tx1"/>
-    </dgm:txFillClrLst>
-    <dgm:txEffectClrLst/>
-  </dgm:styleLbl>
-  <dgm:styleLbl name="fgAcc1">
-    <dgm:fillClrLst meth="repeat">
-      <a:schemeClr val="lt1">
-        <a:alpha val="90000"/>
-      </a:schemeClr>
-    </dgm:fillClrLst>
-    <dgm:linClrLst meth="repeat">
-      <a:schemeClr val="accent1"/>
-    </dgm:linClrLst>
-    <dgm:effectClrLst/>
-    <dgm:txLinClrLst/>
-    <dgm:txFillClrLst meth="repeat">
-      <a:schemeClr val="dk1"/>
-    </dgm:txFillClrLst>
-    <dgm:txEffectClrLst/>
-  </dgm:styleLbl>
-  <dgm:styleLbl name="conFgAcc1">
-    <dgm:fillClrLst meth="repeat">
-      <a:schemeClr val="lt1">
-        <a:alpha val="90000"/>
-      </a:schemeClr>
-    </dgm:fillClrLst>
-    <dgm:linClrLst meth="repeat">
-      <a:schemeClr val="accent1"/>
-    </dgm:linClrLst>
-    <dgm:effectClrLst/>
-    <dgm:txLinClrLst/>
-    <dgm:txFillClrLst meth="repeat">
-      <a:schemeClr val="dk1"/>
-    </dgm:txFillClrLst>
-    <dgm:txEffectClrLst/>
-  </dgm:styleLbl>
-  <dgm:styleLbl name="alignAcc1">
-    <dgm:fillClrLst meth="repeat">
-      <a:schemeClr val="lt1">
-        <a:alpha val="90000"/>
-      </a:schemeClr>
-    </dgm:fillClrLst>
-    <dgm:linClrLst meth="repeat">
-      <a:schemeClr val="accent1"/>
-    </dgm:linClrLst>
-    <dgm:effectClrLst/>
-    <dgm:txLinClrLst/>
-    <dgm:txFillClrLst meth="repeat">
-      <a:schemeClr val="dk1"/>
-    </dgm:txFillClrLst>
-    <dgm:txEffectClrLst/>
-  </dgm:styleLbl>
-  <dgm:styleLbl name="trAlignAcc1">
-    <dgm:fillClrLst meth="repeat">
-      <a:schemeClr val="lt1">
-        <a:alpha val="40000"/>
-      </a:schemeClr>
-    </dgm:fillClrLst>
-    <dgm:linClrLst meth="repeat">
-      <a:schemeClr val="accent1"/>
-    </dgm:linClrLst>
-    <dgm:effectClrLst/>
-    <dgm:txLinClrLst/>
-    <dgm:txFillClrLst meth="repeat">
-      <a:schemeClr val="dk1"/>
-    </dgm:txFillClrLst>
-    <dgm:txEffectClrLst/>
-  </dgm:styleLbl>
-  <dgm:styleLbl name="bgAcc1">
-    <dgm:fillClrLst meth="repeat">
-      <a:schemeClr val="lt1">
-        <a:alpha val="90000"/>
-      </a:schemeClr>
-    </dgm:fillClrLst>
-    <dgm:linClrLst meth="repeat">
-      <a:schemeClr val="accent1"/>
-    </dgm:linClrLst>
-    <dgm:effectClrLst/>
-    <dgm:txLinClrLst/>
-    <dgm:txFillClrLst meth="repeat">
-      <a:schemeClr val="dk1"/>
-    </dgm:txFillClrLst>
-    <dgm:txEffectClrLst/>
-  </dgm:styleLbl>
-  <dgm:styleLbl name="solidFgAcc1">
-    <dgm:fillClrLst meth="repeat">
-      <a:schemeClr val="lt1"/>
-    </dgm:fillClrLst>
-    <dgm:linClrLst meth="repeat">
-      <a:schemeClr val="accent1"/>
-    </dgm:linClrLst>
-    <dgm:effectClrLst/>
-    <dgm:txLinClrLst/>
-    <dgm:txFillClrLst meth="repeat">
-      <a:schemeClr val="dk1"/>
-    </dgm:txFillClrLst>
-    <dgm:txEffectClrLst/>
-  </dgm:styleLbl>
-  <dgm:styleLbl name="solidAlignAcc1">
-    <dgm:fillClrLst meth="repeat">
-      <a:schemeClr val="lt1"/>
-    </dgm:fillClrLst>
-    <dgm:linClrLst meth="repeat">
-      <a:schemeClr val="accent1"/>
-    </dgm:linClrLst>
-    <dgm:effectClrLst/>
-    <dgm:txLinClrLst/>
-    <dgm:txFillClrLst meth="repeat">
-      <a:schemeClr val="dk1"/>
-    </dgm:txFillClrLst>
-    <dgm:txEffectClrLst/>
-  </dgm:styleLbl>
-  <dgm:styleLbl name="solidBgAcc1">
-    <dgm:fillClrLst meth="repeat">
-      <a:schemeClr val="lt1"/>
-    </dgm:fillClrLst>
-    <dgm:linClrLst meth="repeat">
-      <a:schemeClr val="accent1"/>
-    </dgm:linClrLst>
-    <dgm:effectClrLst/>
-    <dgm:txLinClrLst/>
-    <dgm:txFillClrLst meth="repeat">
-      <a:schemeClr val="dk1"/>
-    </dgm:txFillClrLst>
-    <dgm:txEffectClrLst/>
-  </dgm:styleLbl>
-  <dgm:styleLbl name="fgAccFollowNode1">
-    <dgm:fillClrLst meth="repeat">
-      <a:schemeClr val="accent1">
-        <a:alpha val="90000"/>
-        <a:tint val="40000"/>
-      </a:schemeClr>
-    </dgm:fillClrLst>
-    <dgm:linClrLst meth="repeat">
-      <a:schemeClr val="accent1">
-        <a:alpha val="90000"/>
-        <a:tint val="40000"/>
-      </a:schemeClr>
-    </dgm:linClrLst>
-    <dgm:effectClrLst/>
-    <dgm:txLinClrLst/>
-    <dgm:txFillClrLst meth="repeat">
-      <a:schemeClr val="dk1"/>
-    </dgm:txFillClrLst>
-    <dgm:txEffectClrLst/>
-  </dgm:styleLbl>
-  <dgm:styleLbl name="alignAccFollowNode1">
-    <dgm:fillClrLst meth="repeat">
-      <a:schemeClr val="accent1">
-        <a:alpha val="90000"/>
-        <a:tint val="40000"/>
-      </a:schemeClr>
-    </dgm:fillClrLst>
-    <dgm:linClrLst meth="repeat">
-      <a:schemeClr val="accent1">
-        <a:alpha val="90000"/>
-        <a:tint val="40000"/>
-      </a:schemeClr>
-    </dgm:linClrLst>
-    <dgm:effectClrLst/>
-    <dgm:txLinClrLst/>
-    <dgm:txFillClrLst meth="repeat">
-      <a:schemeClr val="dk1"/>
-    </dgm:txFillClrLst>
-    <dgm:txEffectClrLst/>
-  </dgm:styleLbl>
-  <dgm:styleLbl name="bgAccFollowNode1">
-    <dgm:fillClrLst meth="repeat">
-      <a:schemeClr val="accent1">
-        <a:alpha val="90000"/>
-        <a:tint val="40000"/>
-      </a:schemeClr>
-    </dgm:fillClrLst>
-    <dgm:linClrLst meth="repeat">
-      <a:schemeClr val="accent1">
-        <a:alpha val="90000"/>
-        <a:tint val="40000"/>
-      </a:schemeClr>
-    </dgm:linClrLst>
-    <dgm:effectClrLst/>
-    <dgm:txLinClrLst/>
-    <dgm:txFillClrLst meth="repeat">
-      <a:schemeClr val="dk1"/>
-    </dgm:txFillClrLst>
-    <dgm:txEffectClrLst/>
-  </dgm:styleLbl>
-  <dgm:styleLbl name="fgAcc0">
-    <dgm:fillClrLst meth="repeat">
-      <a:schemeClr val="lt1">
-        <a:alpha val="90000"/>
-      </a:schemeClr>
-    </dgm:fillClrLst>
-    <dgm:linClrLst meth="repeat">
-      <a:schemeClr val="accent1"/>
-    </dgm:linClrLst>
-    <dgm:effectClrLst/>
-    <dgm:txLinClrLst/>
-    <dgm:txFillClrLst meth="repeat">
-      <a:schemeClr val="dk1"/>
-    </dgm:txFillClrLst>
-    <dgm:txEffectClrLst/>
-  </dgm:styleLbl>
-  <dgm:styleLbl name="fgAcc2">
-    <dgm:fillClrLst meth="repeat">
-      <a:schemeClr val="lt1">
-        <a:alpha val="90000"/>
-      </a:schemeClr>
-    </dgm:fillClrLst>
-    <dgm:linClrLst meth="repeat">
-      <a:schemeClr val="accent1"/>
-    </dgm:linClrLst>
-    <dgm:effectClrLst/>
-    <dgm:txLinClrLst/>
-    <dgm:txFillClrLst meth="repeat">
-      <a:schemeClr val="dk1"/>
-    </dgm:txFillClrLst>
-    <dgm:txEffectClrLst/>
-  </dgm:styleLbl>
-  <dgm:styleLbl name="fgAcc3">
-    <dgm:fillClrLst meth="repeat">
-      <a:schemeClr val="lt1">
-        <a:alpha val="90000"/>
-      </a:schemeClr>
-    </dgm:fillClrLst>
-    <dgm:linClrLst meth="repeat">
-      <a:schemeClr val="accent1"/>
-    </dgm:linClrLst>
-    <dgm:effectClrLst/>
-    <dgm:txLinClrLst/>
-    <dgm:txFillClrLst meth="repeat">
-      <a:schemeClr val="dk1"/>
-    </dgm:txFillClrLst>
-    <dgm:txEffectClrLst/>
-  </dgm:styleLbl>
-  <dgm:styleLbl name="fgAcc4">
-    <dgm:fillClrLst meth="repeat">
-      <a:schemeClr val="lt1">
-        <a:alpha val="90000"/>
-      </a:schemeClr>
-    </dgm:fillClrLst>
-    <dgm:linClrLst meth="repeat">
-      <a:schemeClr val="accent1"/>
-    </dgm:linClrLst>
-    <dgm:effectClrLst/>
-    <dgm:txLinClrLst/>
-    <dgm:txFillClrLst meth="repeat">
-      <a:schemeClr val="dk1"/>
-    </dgm:txFillClrLst>
-    <dgm:txEffectClrLst/>
-  </dgm:styleLbl>
-  <dgm:styleLbl name="bgShp">
-    <dgm:fillClrLst meth="repeat">
-      <a:schemeClr val="accent1">
-        <a:tint val="40000"/>
-      </a:schemeClr>
-    </dgm:fillClrLst>
-    <dgm:linClrLst meth="repeat">
-      <a:schemeClr val="accent1"/>
-    </dgm:linClrLst>
-    <dgm:effectClrLst/>
-    <dgm:txLinClrLst/>
-    <dgm:txFillClrLst meth="repeat">
-      <a:schemeClr val="dk1"/>
-    </dgm:txFillClrLst>
-    <dgm:txEffectClrLst/>
-  </dgm:styleLbl>
-  <dgm:styleLbl name="dkBgShp">
-    <dgm:fillClrLst meth="repeat">
-      <a:schemeClr val="accent1">
-        <a:shade val="80000"/>
-      </a:schemeClr>
-    </dgm:fillClrLst>
-    <dgm:linClrLst meth="repeat">
-      <a:schemeClr val="accent1"/>
-    </dgm:linClrLst>
-    <dgm:effectClrLst/>
-    <dgm:txLinClrLst/>
-    <dgm:txFillClrLst meth="repeat">
-      <a:schemeClr val="lt1"/>
-    </dgm:txFillClrLst>
-    <dgm:txEffectClrLst/>
-  </dgm:styleLbl>
-  <dgm:styleLbl name="trBgShp">
-    <dgm:fillClrLst meth="repeat">
-      <a:schemeClr val="accent1">
-        <a:tint val="50000"/>
-        <a:alpha val="40000"/>
-      </a:schemeClr>
-    </dgm:fillClrLst>
-    <dgm:linClrLst meth="repeat">
-      <a:schemeClr val="accent1"/>
-    </dgm:linClrLst>
-    <dgm:effectClrLst/>
-    <dgm:txLinClrLst/>
-    <dgm:txFillClrLst meth="repeat">
-      <a:schemeClr val="lt1"/>
-    </dgm:txFillClrLst>
-    <dgm:txEffectClrLst/>
-  </dgm:styleLbl>
-  <dgm:styleLbl name="fgShp">
-    <dgm:fillClrLst meth="repeat">
-      <a:schemeClr val="accent1">
-        <a:tint val="60000"/>
-      </a:schemeClr>
-    </dgm:fillClrLst>
-    <dgm:linClrLst meth="repeat">
-      <a:schemeClr val="lt1"/>
-    </dgm:linClrLst>
-    <dgm:effectClrLst/>
-    <dgm:txLinClrLst/>
-    <dgm:txFillClrLst meth="repeat">
-      <a:schemeClr val="dk1"/>
-    </dgm:txFillClrLst>
-    <dgm:txEffectClrLst/>
-  </dgm:styleLbl>
-  <dgm:styleLbl name="revTx">
-    <dgm:fillClrLst meth="repeat">
-      <a:schemeClr val="lt1">
-        <a:alpha val="0"/>
-      </a:schemeClr>
-    </dgm:fillClrLst>
-    <dgm:linClrLst meth="repeat">
-      <a:schemeClr val="dk1">
-        <a:alpha val="0"/>
-      </a:schemeClr>
-    </dgm:linClrLst>
-    <dgm:effectClrLst/>
-    <dgm:txLinClrLst/>
-    <dgm:txFillClrLst meth="repeat">
-      <a:schemeClr val="tx1"/>
-    </dgm:txFillClrLst>
-    <dgm:txEffectClrLst/>
-  </dgm:styleLbl>
-</dgm:colorsDef>
-</file>
-
-<file path=ppt/diagrams/data1.xml><?xml version="1.0" encoding="utf-8"?>
-<dgm:dataModel xmlns:dgm="http://schemas.openxmlformats.org/drawingml/2006/diagram" xmlns:a="http://schemas.openxmlformats.org/drawingml/2006/main">
-  <dgm:ptLst>
-    <dgm:pt modelId="{9ECDA0C9-682F-42B6-8758-B726257879FB}" type="doc">
-      <dgm:prSet loTypeId="urn:microsoft.com/office/officeart/2005/8/layout/pList2" loCatId="list" qsTypeId="urn:microsoft.com/office/officeart/2005/8/quickstyle/simple1" qsCatId="simple" csTypeId="urn:microsoft.com/office/officeart/2005/8/colors/accent1_2" csCatId="accent1" phldr="1"/>
-      <dgm:spPr/>
-    </dgm:pt>
-    <dgm:pt modelId="{49EF0FF6-4954-42F8-9044-E95087FA1314}">
-      <dgm:prSet phldrT="[Tekst]"/>
-      <dgm:spPr/>
-      <dgm:t>
-        <a:bodyPr/>
-        <a:lstStyle/>
-        <a:p>
-          <a:r>
-            <a:rPr lang="pl-PL" dirty="0" err="1"/>
-            <a:t>Text</a:t>
-          </a:r>
-          <a:endParaRPr lang="pl-PL" dirty="0"/>
-        </a:p>
-      </dgm:t>
-    </dgm:pt>
-    <dgm:pt modelId="{99FD87B5-708E-465E-A1AE-74B2865270F7}" type="parTrans" cxnId="{0B645E1C-2EAE-4C64-B271-0AF541AD9249}">
-      <dgm:prSet/>
-      <dgm:spPr/>
-      <dgm:t>
-        <a:bodyPr/>
-        <a:lstStyle/>
-        <a:p>
-          <a:endParaRPr lang="pl-PL"/>
-        </a:p>
-      </dgm:t>
-    </dgm:pt>
-    <dgm:pt modelId="{CFC5632C-2073-4C1D-8191-36E4FEE07FC7}" type="sibTrans" cxnId="{0B645E1C-2EAE-4C64-B271-0AF541AD9249}">
-      <dgm:prSet/>
-      <dgm:spPr/>
-      <dgm:t>
-        <a:bodyPr/>
-        <a:lstStyle/>
-        <a:p>
-          <a:endParaRPr lang="pl-PL"/>
-        </a:p>
-      </dgm:t>
-    </dgm:pt>
-    <dgm:pt modelId="{A67AC038-1473-471A-8B9D-753D62223CF0}">
-      <dgm:prSet phldrT="[Tekst]"/>
-      <dgm:spPr/>
-      <dgm:t>
-        <a:bodyPr/>
-        <a:lstStyle/>
-        <a:p>
-          <a:r>
-            <a:rPr lang="pl-PL" dirty="0"/>
-            <a:t>Was</a:t>
-          </a:r>
-        </a:p>
-      </dgm:t>
-    </dgm:pt>
-    <dgm:pt modelId="{C3BE3275-75F7-421E-A9D1-BBAEA1D128AF}" type="parTrans" cxnId="{2505BA73-A994-412F-8ACE-C1451B347F40}">
-      <dgm:prSet/>
-      <dgm:spPr/>
-      <dgm:t>
-        <a:bodyPr/>
-        <a:lstStyle/>
-        <a:p>
-          <a:endParaRPr lang="pl-PL"/>
-        </a:p>
-      </dgm:t>
-    </dgm:pt>
-    <dgm:pt modelId="{D1B699A5-9C1F-490A-A29E-CD2237C21398}" type="sibTrans" cxnId="{2505BA73-A994-412F-8ACE-C1451B347F40}">
-      <dgm:prSet/>
-      <dgm:spPr/>
-      <dgm:t>
-        <a:bodyPr/>
-        <a:lstStyle/>
-        <a:p>
-          <a:endParaRPr lang="pl-PL"/>
-        </a:p>
-      </dgm:t>
-    </dgm:pt>
-    <dgm:pt modelId="{E98095AB-594E-427C-B460-B2BBC90DB41D}">
-      <dgm:prSet phldrT="[Tekst]"/>
-      <dgm:spPr/>
-      <dgm:t>
-        <a:bodyPr/>
-        <a:lstStyle/>
-        <a:p>
-          <a:r>
-            <a:rPr lang="pl-PL" dirty="0" err="1"/>
-            <a:t>Mirrored</a:t>
-          </a:r>
-          <a:endParaRPr lang="pl-PL" dirty="0"/>
-        </a:p>
-      </dgm:t>
-    </dgm:pt>
-    <dgm:pt modelId="{50237188-A0B2-4ED2-A17A-3B929BFB0D8B}" type="parTrans" cxnId="{149F31F9-D227-4FA5-815C-B4442ABFD2C1}">
-      <dgm:prSet/>
-      <dgm:spPr/>
-      <dgm:t>
-        <a:bodyPr/>
-        <a:lstStyle/>
-        <a:p>
-          <a:endParaRPr lang="pl-PL"/>
-        </a:p>
-      </dgm:t>
-    </dgm:pt>
-    <dgm:pt modelId="{63F8AE3B-2CD6-49D1-85E5-07B07F18997D}" type="sibTrans" cxnId="{149F31F9-D227-4FA5-815C-B4442ABFD2C1}">
-      <dgm:prSet/>
-      <dgm:spPr/>
-      <dgm:t>
-        <a:bodyPr/>
-        <a:lstStyle/>
-        <a:p>
-          <a:endParaRPr lang="pl-PL"/>
-        </a:p>
-      </dgm:t>
-    </dgm:pt>
-    <dgm:pt modelId="{A00E7EB7-BF87-4472-AB9A-01B28361D0C9}" type="pres">
-      <dgm:prSet presAssocID="{9ECDA0C9-682F-42B6-8758-B726257879FB}" presName="Name0" presStyleCnt="0">
-        <dgm:presLayoutVars>
-          <dgm:dir/>
-          <dgm:resizeHandles val="exact"/>
-        </dgm:presLayoutVars>
-      </dgm:prSet>
-      <dgm:spPr/>
-    </dgm:pt>
-    <dgm:pt modelId="{93F0BDB9-6AC2-438C-B111-E45C871A82D3}" type="pres">
-      <dgm:prSet presAssocID="{9ECDA0C9-682F-42B6-8758-B726257879FB}" presName="bkgdShp" presStyleLbl="alignAccFollowNode1" presStyleIdx="0" presStyleCnt="1"/>
-      <dgm:spPr/>
-    </dgm:pt>
-    <dgm:pt modelId="{60E767D5-7508-4699-AD3D-5F3330BB4E2A}" type="pres">
-      <dgm:prSet presAssocID="{9ECDA0C9-682F-42B6-8758-B726257879FB}" presName="linComp" presStyleCnt="0"/>
-      <dgm:spPr/>
-    </dgm:pt>
-    <dgm:pt modelId="{9AF4C8CC-293B-4966-A648-4258A1D10F4A}" type="pres">
-      <dgm:prSet presAssocID="{49EF0FF6-4954-42F8-9044-E95087FA1314}" presName="compNode" presStyleCnt="0"/>
-      <dgm:spPr/>
-    </dgm:pt>
-    <dgm:pt modelId="{A81F5B48-4BED-4CA2-BC07-B1E0565129C3}" type="pres">
-      <dgm:prSet presAssocID="{49EF0FF6-4954-42F8-9044-E95087FA1314}" presName="node" presStyleLbl="node1" presStyleIdx="0" presStyleCnt="3">
-        <dgm:presLayoutVars>
-          <dgm:bulletEnabled val="1"/>
-        </dgm:presLayoutVars>
-      </dgm:prSet>
-      <dgm:spPr/>
-    </dgm:pt>
-    <dgm:pt modelId="{6B2D7C21-9BBD-48AF-B068-DCACB473D625}" type="pres">
-      <dgm:prSet presAssocID="{49EF0FF6-4954-42F8-9044-E95087FA1314}" presName="invisiNode" presStyleLbl="node1" presStyleIdx="0" presStyleCnt="3"/>
-      <dgm:spPr/>
-    </dgm:pt>
-    <dgm:pt modelId="{22A3CD1F-D3E8-4352-953A-2A8BF48557A5}" type="pres">
-      <dgm:prSet presAssocID="{49EF0FF6-4954-42F8-9044-E95087FA1314}" presName="imagNode" presStyleLbl="fgImgPlace1" presStyleIdx="0" presStyleCnt="3"/>
-      <dgm:spPr/>
-    </dgm:pt>
-    <dgm:pt modelId="{35DCD64A-24C7-48B7-9E90-CB5D983F6823}" type="pres">
-      <dgm:prSet presAssocID="{CFC5632C-2073-4C1D-8191-36E4FEE07FC7}" presName="sibTrans" presStyleLbl="sibTrans2D1" presStyleIdx="0" presStyleCnt="0"/>
-      <dgm:spPr/>
-    </dgm:pt>
-    <dgm:pt modelId="{6CF3C3A8-AC26-4C3A-A5AE-83AC904CC638}" type="pres">
-      <dgm:prSet presAssocID="{A67AC038-1473-471A-8B9D-753D62223CF0}" presName="compNode" presStyleCnt="0"/>
-      <dgm:spPr/>
-    </dgm:pt>
-    <dgm:pt modelId="{8763F493-628E-4740-95A1-75B6216BA223}" type="pres">
-      <dgm:prSet presAssocID="{A67AC038-1473-471A-8B9D-753D62223CF0}" presName="node" presStyleLbl="node1" presStyleIdx="1" presStyleCnt="3">
-        <dgm:presLayoutVars>
-          <dgm:bulletEnabled val="1"/>
-        </dgm:presLayoutVars>
-      </dgm:prSet>
-      <dgm:spPr/>
-    </dgm:pt>
-    <dgm:pt modelId="{23BEC57C-7A54-4B3D-835D-1C9451239ED4}" type="pres">
-      <dgm:prSet presAssocID="{A67AC038-1473-471A-8B9D-753D62223CF0}" presName="invisiNode" presStyleLbl="node1" presStyleIdx="1" presStyleCnt="3"/>
-      <dgm:spPr/>
-    </dgm:pt>
-    <dgm:pt modelId="{341002CB-86E3-4BEA-B6B0-B514F8AD0E00}" type="pres">
-      <dgm:prSet presAssocID="{A67AC038-1473-471A-8B9D-753D62223CF0}" presName="imagNode" presStyleLbl="fgImgPlace1" presStyleIdx="1" presStyleCnt="3"/>
-      <dgm:spPr/>
-    </dgm:pt>
-    <dgm:pt modelId="{CE49B735-5E89-446B-A3A1-B3F87F6E918B}" type="pres">
-      <dgm:prSet presAssocID="{D1B699A5-9C1F-490A-A29E-CD2237C21398}" presName="sibTrans" presStyleLbl="sibTrans2D1" presStyleIdx="0" presStyleCnt="0"/>
-      <dgm:spPr/>
-    </dgm:pt>
-    <dgm:pt modelId="{AC0048C5-E0C0-4AD2-98EB-83B508DE9CFB}" type="pres">
-      <dgm:prSet presAssocID="{E98095AB-594E-427C-B460-B2BBC90DB41D}" presName="compNode" presStyleCnt="0"/>
-      <dgm:spPr/>
-    </dgm:pt>
-    <dgm:pt modelId="{C9CAFAFD-1363-4AD2-9D39-08D524924E96}" type="pres">
-      <dgm:prSet presAssocID="{E98095AB-594E-427C-B460-B2BBC90DB41D}" presName="node" presStyleLbl="node1" presStyleIdx="2" presStyleCnt="3">
-        <dgm:presLayoutVars>
-          <dgm:bulletEnabled val="1"/>
-        </dgm:presLayoutVars>
-      </dgm:prSet>
-      <dgm:spPr/>
-    </dgm:pt>
-    <dgm:pt modelId="{C8901933-4A2A-4E50-A1C1-2A681DBFA70E}" type="pres">
-      <dgm:prSet presAssocID="{E98095AB-594E-427C-B460-B2BBC90DB41D}" presName="invisiNode" presStyleLbl="node1" presStyleIdx="2" presStyleCnt="3"/>
-      <dgm:spPr/>
-    </dgm:pt>
-    <dgm:pt modelId="{81B2DFD7-652D-4F4D-A4A5-CBAE188262BC}" type="pres">
-      <dgm:prSet presAssocID="{E98095AB-594E-427C-B460-B2BBC90DB41D}" presName="imagNode" presStyleLbl="fgImgPlace1" presStyleIdx="2" presStyleCnt="3"/>
-      <dgm:spPr/>
-    </dgm:pt>
-  </dgm:ptLst>
-  <dgm:cxnLst>
-    <dgm:cxn modelId="{0B645E1C-2EAE-4C64-B271-0AF541AD9249}" srcId="{9ECDA0C9-682F-42B6-8758-B726257879FB}" destId="{49EF0FF6-4954-42F8-9044-E95087FA1314}" srcOrd="0" destOrd="0" parTransId="{99FD87B5-708E-465E-A1AE-74B2865270F7}" sibTransId="{CFC5632C-2073-4C1D-8191-36E4FEE07FC7}"/>
-    <dgm:cxn modelId="{4F60E344-4328-43D9-9B33-5E7F90BF8F1F}" type="presOf" srcId="{D1B699A5-9C1F-490A-A29E-CD2237C21398}" destId="{CE49B735-5E89-446B-A3A1-B3F87F6E918B}" srcOrd="0" destOrd="0" presId="urn:microsoft.com/office/officeart/2005/8/layout/pList2"/>
-    <dgm:cxn modelId="{248DD548-6874-4D68-A16D-8DD74F83F723}" type="presOf" srcId="{49EF0FF6-4954-42F8-9044-E95087FA1314}" destId="{A81F5B48-4BED-4CA2-BC07-B1E0565129C3}" srcOrd="0" destOrd="0" presId="urn:microsoft.com/office/officeart/2005/8/layout/pList2"/>
-    <dgm:cxn modelId="{2505BA73-A994-412F-8ACE-C1451B347F40}" srcId="{9ECDA0C9-682F-42B6-8758-B726257879FB}" destId="{A67AC038-1473-471A-8B9D-753D62223CF0}" srcOrd="1" destOrd="0" parTransId="{C3BE3275-75F7-421E-A9D1-BBAEA1D128AF}" sibTransId="{D1B699A5-9C1F-490A-A29E-CD2237C21398}"/>
-    <dgm:cxn modelId="{D618F680-C639-4535-8923-2BE06964AB11}" type="presOf" srcId="{A67AC038-1473-471A-8B9D-753D62223CF0}" destId="{8763F493-628E-4740-95A1-75B6216BA223}" srcOrd="0" destOrd="0" presId="urn:microsoft.com/office/officeart/2005/8/layout/pList2"/>
-    <dgm:cxn modelId="{5D6DA08B-1E86-4A40-9B82-593D2CBC58F8}" type="presOf" srcId="{9ECDA0C9-682F-42B6-8758-B726257879FB}" destId="{A00E7EB7-BF87-4472-AB9A-01B28361D0C9}" srcOrd="0" destOrd="0" presId="urn:microsoft.com/office/officeart/2005/8/layout/pList2"/>
-    <dgm:cxn modelId="{0DEC94AE-78ED-4CF7-90ED-C152E2889DBB}" type="presOf" srcId="{CFC5632C-2073-4C1D-8191-36E4FEE07FC7}" destId="{35DCD64A-24C7-48B7-9E90-CB5D983F6823}" srcOrd="0" destOrd="0" presId="urn:microsoft.com/office/officeart/2005/8/layout/pList2"/>
-    <dgm:cxn modelId="{DC1B60B6-003B-4ECC-8B74-1ED4A845A25E}" type="presOf" srcId="{E98095AB-594E-427C-B460-B2BBC90DB41D}" destId="{C9CAFAFD-1363-4AD2-9D39-08D524924E96}" srcOrd="0" destOrd="0" presId="urn:microsoft.com/office/officeart/2005/8/layout/pList2"/>
-    <dgm:cxn modelId="{149F31F9-D227-4FA5-815C-B4442ABFD2C1}" srcId="{9ECDA0C9-682F-42B6-8758-B726257879FB}" destId="{E98095AB-594E-427C-B460-B2BBC90DB41D}" srcOrd="2" destOrd="0" parTransId="{50237188-A0B2-4ED2-A17A-3B929BFB0D8B}" sibTransId="{63F8AE3B-2CD6-49D1-85E5-07B07F18997D}"/>
-    <dgm:cxn modelId="{2FD87B1B-C52C-424C-83FF-9EC26DBB7F02}" type="presParOf" srcId="{A00E7EB7-BF87-4472-AB9A-01B28361D0C9}" destId="{93F0BDB9-6AC2-438C-B111-E45C871A82D3}" srcOrd="0" destOrd="0" presId="urn:microsoft.com/office/officeart/2005/8/layout/pList2"/>
-    <dgm:cxn modelId="{14F0A5E6-3885-4519-8D65-538C5C61B79E}" type="presParOf" srcId="{A00E7EB7-BF87-4472-AB9A-01B28361D0C9}" destId="{60E767D5-7508-4699-AD3D-5F3330BB4E2A}" srcOrd="1" destOrd="0" presId="urn:microsoft.com/office/officeart/2005/8/layout/pList2"/>
-    <dgm:cxn modelId="{1718B1B7-123B-4F76-BACB-0F5AAA0F61A9}" type="presParOf" srcId="{60E767D5-7508-4699-AD3D-5F3330BB4E2A}" destId="{9AF4C8CC-293B-4966-A648-4258A1D10F4A}" srcOrd="0" destOrd="0" presId="urn:microsoft.com/office/officeart/2005/8/layout/pList2"/>
-    <dgm:cxn modelId="{1AA84959-A24F-47E2-B47D-75B6781391BD}" type="presParOf" srcId="{9AF4C8CC-293B-4966-A648-4258A1D10F4A}" destId="{A81F5B48-4BED-4CA2-BC07-B1E0565129C3}" srcOrd="0" destOrd="0" presId="urn:microsoft.com/office/officeart/2005/8/layout/pList2"/>
-    <dgm:cxn modelId="{37B4F66E-DCD4-42A7-A112-42DF50E3FD7B}" type="presParOf" srcId="{9AF4C8CC-293B-4966-A648-4258A1D10F4A}" destId="{6B2D7C21-9BBD-48AF-B068-DCACB473D625}" srcOrd="1" destOrd="0" presId="urn:microsoft.com/office/officeart/2005/8/layout/pList2"/>
-    <dgm:cxn modelId="{58DDB40B-D6B3-4AE4-9A52-6DD8B7EA5528}" type="presParOf" srcId="{9AF4C8CC-293B-4966-A648-4258A1D10F4A}" destId="{22A3CD1F-D3E8-4352-953A-2A8BF48557A5}" srcOrd="2" destOrd="0" presId="urn:microsoft.com/office/officeart/2005/8/layout/pList2"/>
-    <dgm:cxn modelId="{C8E64650-F919-4D29-A4FB-0FB1390FF60C}" type="presParOf" srcId="{60E767D5-7508-4699-AD3D-5F3330BB4E2A}" destId="{35DCD64A-24C7-48B7-9E90-CB5D983F6823}" srcOrd="1" destOrd="0" presId="urn:microsoft.com/office/officeart/2005/8/layout/pList2"/>
-    <dgm:cxn modelId="{904E483D-3324-4DE3-AB4C-12F2736E6B40}" type="presParOf" srcId="{60E767D5-7508-4699-AD3D-5F3330BB4E2A}" destId="{6CF3C3A8-AC26-4C3A-A5AE-83AC904CC638}" srcOrd="2" destOrd="0" presId="urn:microsoft.com/office/officeart/2005/8/layout/pList2"/>
-    <dgm:cxn modelId="{A870CDB5-F929-4CC0-A3EA-C5CF9A483DC3}" type="presParOf" srcId="{6CF3C3A8-AC26-4C3A-A5AE-83AC904CC638}" destId="{8763F493-628E-4740-95A1-75B6216BA223}" srcOrd="0" destOrd="0" presId="urn:microsoft.com/office/officeart/2005/8/layout/pList2"/>
-    <dgm:cxn modelId="{3A421E1A-860F-4387-88E1-FE345E9595DE}" type="presParOf" srcId="{6CF3C3A8-AC26-4C3A-A5AE-83AC904CC638}" destId="{23BEC57C-7A54-4B3D-835D-1C9451239ED4}" srcOrd="1" destOrd="0" presId="urn:microsoft.com/office/officeart/2005/8/layout/pList2"/>
-    <dgm:cxn modelId="{3E7A605F-8768-4F1A-AF94-E9A40AFF5BC4}" type="presParOf" srcId="{6CF3C3A8-AC26-4C3A-A5AE-83AC904CC638}" destId="{341002CB-86E3-4BEA-B6B0-B514F8AD0E00}" srcOrd="2" destOrd="0" presId="urn:microsoft.com/office/officeart/2005/8/layout/pList2"/>
-    <dgm:cxn modelId="{88A9A4CB-F0A2-4C0E-9F8E-FE49833B5F6C}" type="presParOf" srcId="{60E767D5-7508-4699-AD3D-5F3330BB4E2A}" destId="{CE49B735-5E89-446B-A3A1-B3F87F6E918B}" srcOrd="3" destOrd="0" presId="urn:microsoft.com/office/officeart/2005/8/layout/pList2"/>
-    <dgm:cxn modelId="{4E32098E-9EA1-4CE9-9431-1C2BAB6566E8}" type="presParOf" srcId="{60E767D5-7508-4699-AD3D-5F3330BB4E2A}" destId="{AC0048C5-E0C0-4AD2-98EB-83B508DE9CFB}" srcOrd="4" destOrd="0" presId="urn:microsoft.com/office/officeart/2005/8/layout/pList2"/>
-    <dgm:cxn modelId="{ECB84C5C-8685-43A1-96A1-AA5C328D5DDF}" type="presParOf" srcId="{AC0048C5-E0C0-4AD2-98EB-83B508DE9CFB}" destId="{C9CAFAFD-1363-4AD2-9D39-08D524924E96}" srcOrd="0" destOrd="0" presId="urn:microsoft.com/office/officeart/2005/8/layout/pList2"/>
-    <dgm:cxn modelId="{78E0AF2B-354E-409F-935C-B14128A6715C}" type="presParOf" srcId="{AC0048C5-E0C0-4AD2-98EB-83B508DE9CFB}" destId="{C8901933-4A2A-4E50-A1C1-2A681DBFA70E}" srcOrd="1" destOrd="0" presId="urn:microsoft.com/office/officeart/2005/8/layout/pList2"/>
-    <dgm:cxn modelId="{108870F0-C39B-457A-9952-A459251FD337}" type="presParOf" srcId="{AC0048C5-E0C0-4AD2-98EB-83B508DE9CFB}" destId="{81B2DFD7-652D-4F4D-A4A5-CBAE188262BC}" srcOrd="2" destOrd="0" presId="urn:microsoft.com/office/officeart/2005/8/layout/pList2"/>
-  </dgm:cxnLst>
-  <dgm:bg/>
-  <dgm:whole/>
-  <dgm:extLst>
-    <a:ext uri="http://schemas.microsoft.com/office/drawing/2008/diagram">
-      <dsp:dataModelExt xmlns:dsp="http://schemas.microsoft.com/office/drawing/2008/diagram" relId="rId6" minVer="http://schemas.openxmlformats.org/drawingml/2006/diagram"/>
-    </a:ext>
-  </dgm:extLst>
-</dgm:dataModel>
-</file>
-
-<file path=ppt/diagrams/drawing1.xml><?xml version="1.0" encoding="utf-8"?>
-<dsp:drawing xmlns:dgm="http://schemas.openxmlformats.org/drawingml/2006/diagram" xmlns:dsp="http://schemas.microsoft.com/office/drawing/2008/diagram" xmlns:a="http://schemas.openxmlformats.org/drawingml/2006/main">
-  <dsp:spTree>
-    <dsp:nvGrpSpPr>
-      <dsp:cNvPr id="0" name=""/>
-      <dsp:cNvGrpSpPr/>
-    </dsp:nvGrpSpPr>
-    <dsp:grpSpPr/>
-    <dsp:sp modelId="{93F0BDB9-6AC2-438C-B111-E45C871A82D3}">
-      <dsp:nvSpPr>
-        <dsp:cNvPr id="0" name=""/>
-        <dsp:cNvSpPr/>
-      </dsp:nvSpPr>
-      <dsp:spPr>
-        <a:xfrm>
-          <a:off x="0" y="0"/>
-          <a:ext cx="8128000" cy="2438400"/>
-        </a:xfrm>
-        <a:prstGeom prst="roundRect">
-          <a:avLst>
-            <a:gd name="adj" fmla="val 10000"/>
-          </a:avLst>
-        </a:prstGeom>
-        <a:solidFill>
-          <a:schemeClr val="accent1">
-            <a:alpha val="90000"/>
-            <a:tint val="40000"/>
-            <a:hueOff val="0"/>
-            <a:satOff val="0"/>
-            <a:lumOff val="0"/>
-            <a:alphaOff val="0"/>
-          </a:schemeClr>
-        </a:solidFill>
-        <a:ln w="12700" cap="flat" cmpd="sng" algn="ctr">
-          <a:solidFill>
-            <a:schemeClr val="accent1">
-              <a:alpha val="90000"/>
-              <a:tint val="40000"/>
-              <a:hueOff val="0"/>
-              <a:satOff val="0"/>
-              <a:lumOff val="0"/>
-              <a:alphaOff val="0"/>
-            </a:schemeClr>
-          </a:solidFill>
-          <a:prstDash val="solid"/>
-          <a:miter lim="800000"/>
-        </a:ln>
-        <a:effectLst/>
-      </dsp:spPr>
-      <dsp:style>
-        <a:lnRef idx="2">
-          <a:scrgbClr r="0" g="0" b="0"/>
-        </a:lnRef>
-        <a:fillRef idx="1">
-          <a:scrgbClr r="0" g="0" b="0"/>
-        </a:fillRef>
-        <a:effectRef idx="0">
-          <a:scrgbClr r="0" g="0" b="0"/>
-        </a:effectRef>
-        <a:fontRef idx="minor"/>
-      </dsp:style>
-    </dsp:sp>
-    <dsp:sp modelId="{22A3CD1F-D3E8-4352-953A-2A8BF48557A5}">
-      <dsp:nvSpPr>
-        <dsp:cNvPr id="0" name=""/>
-        <dsp:cNvSpPr/>
-      </dsp:nvSpPr>
-      <dsp:spPr>
-        <a:xfrm>
-          <a:off x="243839" y="325120"/>
-          <a:ext cx="2387600" cy="1788160"/>
-        </a:xfrm>
-        <a:prstGeom prst="roundRect">
-          <a:avLst>
-            <a:gd name="adj" fmla="val 10000"/>
-          </a:avLst>
-        </a:prstGeom>
-        <a:solidFill>
-          <a:schemeClr val="accent1">
-            <a:tint val="50000"/>
-            <a:hueOff val="0"/>
-            <a:satOff val="0"/>
-            <a:lumOff val="0"/>
-            <a:alphaOff val="0"/>
-          </a:schemeClr>
-        </a:solidFill>
-        <a:ln w="12700" cap="flat" cmpd="sng" algn="ctr">
-          <a:solidFill>
-            <a:schemeClr val="lt1">
-              <a:hueOff val="0"/>
-              <a:satOff val="0"/>
-              <a:lumOff val="0"/>
-              <a:alphaOff val="0"/>
-            </a:schemeClr>
-          </a:solidFill>
-          <a:prstDash val="solid"/>
-          <a:miter lim="800000"/>
-        </a:ln>
-        <a:effectLst/>
-      </dsp:spPr>
-      <dsp:style>
-        <a:lnRef idx="2">
-          <a:scrgbClr r="0" g="0" b="0"/>
-        </a:lnRef>
-        <a:fillRef idx="1">
-          <a:scrgbClr r="0" g="0" b="0"/>
-        </a:fillRef>
-        <a:effectRef idx="0">
-          <a:scrgbClr r="0" g="0" b="0"/>
-        </a:effectRef>
-        <a:fontRef idx="minor"/>
-      </dsp:style>
-    </dsp:sp>
-    <dsp:sp modelId="{A81F5B48-4BED-4CA2-BC07-B1E0565129C3}">
-      <dsp:nvSpPr>
-        <dsp:cNvPr id="0" name=""/>
-        <dsp:cNvSpPr/>
-      </dsp:nvSpPr>
-      <dsp:spPr>
-        <a:xfrm rot="10800000">
-          <a:off x="243839" y="2438400"/>
-          <a:ext cx="2387600" cy="2980266"/>
-        </a:xfrm>
-        <a:prstGeom prst="round2SameRect">
-          <a:avLst>
-            <a:gd name="adj1" fmla="val 10500"/>
-            <a:gd name="adj2" fmla="val 0"/>
-          </a:avLst>
-        </a:prstGeom>
-        <a:solidFill>
-          <a:schemeClr val="accent1">
-            <a:hueOff val="0"/>
-            <a:satOff val="0"/>
-            <a:lumOff val="0"/>
-            <a:alphaOff val="0"/>
-          </a:schemeClr>
-        </a:solidFill>
-        <a:ln w="12700" cap="flat" cmpd="sng" algn="ctr">
-          <a:solidFill>
-            <a:schemeClr val="lt1">
-              <a:hueOff val="0"/>
-              <a:satOff val="0"/>
-              <a:lumOff val="0"/>
-              <a:alphaOff val="0"/>
-            </a:schemeClr>
-          </a:solidFill>
-          <a:prstDash val="solid"/>
-          <a:miter lim="800000"/>
-        </a:ln>
-        <a:effectLst/>
-      </dsp:spPr>
-      <dsp:style>
-        <a:lnRef idx="2">
-          <a:scrgbClr r="0" g="0" b="0"/>
-        </a:lnRef>
-        <a:fillRef idx="1">
-          <a:scrgbClr r="0" g="0" b="0"/>
-        </a:fillRef>
-        <a:effectRef idx="0">
-          <a:scrgbClr r="0" g="0" b="0"/>
-        </a:effectRef>
-        <a:fontRef idx="minor">
-          <a:schemeClr val="lt1"/>
-        </a:fontRef>
-      </dsp:style>
-      <dsp:txBody>
-        <a:bodyPr spcFirstLastPara="0" vert="horz" wrap="square" lIns="256032" tIns="256032" rIns="256032" bIns="256032" numCol="1" spcCol="1270" anchor="t" anchorCtr="0">
-          <a:noAutofit/>
-        </a:bodyPr>
-        <a:lstStyle/>
-        <a:p>
-          <a:pPr marL="0" lvl="0" indent="0" algn="ctr" defTabSz="1600200">
-            <a:lnSpc>
-              <a:spcPct val="90000"/>
-            </a:lnSpc>
-            <a:spcBef>
-              <a:spcPct val="0"/>
-            </a:spcBef>
-            <a:spcAft>
-              <a:spcPct val="35000"/>
-            </a:spcAft>
-            <a:buNone/>
-          </a:pPr>
-          <a:r>
-            <a:rPr lang="pl-PL" sz="3600" kern="1200" dirty="0" err="1"/>
-            <a:t>Text</a:t>
-          </a:r>
-          <a:endParaRPr lang="pl-PL" sz="3600" kern="1200" dirty="0"/>
-        </a:p>
-      </dsp:txBody>
-      <dsp:txXfrm rot="10800000">
-        <a:off x="317266" y="2438400"/>
-        <a:ext cx="2240746" cy="2906839"/>
-      </dsp:txXfrm>
-    </dsp:sp>
-    <dsp:sp modelId="{341002CB-86E3-4BEA-B6B0-B514F8AD0E00}">
-      <dsp:nvSpPr>
-        <dsp:cNvPr id="0" name=""/>
-        <dsp:cNvSpPr/>
-      </dsp:nvSpPr>
-      <dsp:spPr>
-        <a:xfrm>
-          <a:off x="2870200" y="325120"/>
-          <a:ext cx="2387600" cy="1788160"/>
-        </a:xfrm>
-        <a:prstGeom prst="roundRect">
-          <a:avLst>
-            <a:gd name="adj" fmla="val 10000"/>
-          </a:avLst>
-        </a:prstGeom>
-        <a:solidFill>
-          <a:schemeClr val="accent1">
-            <a:tint val="50000"/>
-            <a:hueOff val="0"/>
-            <a:satOff val="0"/>
-            <a:lumOff val="0"/>
-            <a:alphaOff val="0"/>
-          </a:schemeClr>
-        </a:solidFill>
-        <a:ln w="12700" cap="flat" cmpd="sng" algn="ctr">
-          <a:solidFill>
-            <a:schemeClr val="lt1">
-              <a:hueOff val="0"/>
-              <a:satOff val="0"/>
-              <a:lumOff val="0"/>
-              <a:alphaOff val="0"/>
-            </a:schemeClr>
-          </a:solidFill>
-          <a:prstDash val="solid"/>
-          <a:miter lim="800000"/>
-        </a:ln>
-        <a:effectLst/>
-      </dsp:spPr>
-      <dsp:style>
-        <a:lnRef idx="2">
-          <a:scrgbClr r="0" g="0" b="0"/>
-        </a:lnRef>
-        <a:fillRef idx="1">
-          <a:scrgbClr r="0" g="0" b="0"/>
-        </a:fillRef>
-        <a:effectRef idx="0">
-          <a:scrgbClr r="0" g="0" b="0"/>
-        </a:effectRef>
-        <a:fontRef idx="minor"/>
-      </dsp:style>
-    </dsp:sp>
-    <dsp:sp modelId="{8763F493-628E-4740-95A1-75B6216BA223}">
-      <dsp:nvSpPr>
-        <dsp:cNvPr id="0" name=""/>
-        <dsp:cNvSpPr/>
-      </dsp:nvSpPr>
-      <dsp:spPr>
-        <a:xfrm rot="10800000">
-          <a:off x="2870200" y="2438400"/>
-          <a:ext cx="2387600" cy="2980266"/>
-        </a:xfrm>
-        <a:prstGeom prst="round2SameRect">
-          <a:avLst>
-            <a:gd name="adj1" fmla="val 10500"/>
-            <a:gd name="adj2" fmla="val 0"/>
-          </a:avLst>
-        </a:prstGeom>
-        <a:solidFill>
-          <a:schemeClr val="accent1">
-            <a:hueOff val="0"/>
-            <a:satOff val="0"/>
-            <a:lumOff val="0"/>
-            <a:alphaOff val="0"/>
-          </a:schemeClr>
-        </a:solidFill>
-        <a:ln w="12700" cap="flat" cmpd="sng" algn="ctr">
-          <a:solidFill>
-            <a:schemeClr val="lt1">
-              <a:hueOff val="0"/>
-              <a:satOff val="0"/>
-              <a:lumOff val="0"/>
-              <a:alphaOff val="0"/>
-            </a:schemeClr>
-          </a:solidFill>
-          <a:prstDash val="solid"/>
-          <a:miter lim="800000"/>
-        </a:ln>
-        <a:effectLst/>
-      </dsp:spPr>
-      <dsp:style>
-        <a:lnRef idx="2">
-          <a:scrgbClr r="0" g="0" b="0"/>
-        </a:lnRef>
-        <a:fillRef idx="1">
-          <a:scrgbClr r="0" g="0" b="0"/>
-        </a:fillRef>
-        <a:effectRef idx="0">
-          <a:scrgbClr r="0" g="0" b="0"/>
-        </a:effectRef>
-        <a:fontRef idx="minor">
-          <a:schemeClr val="lt1"/>
-        </a:fontRef>
-      </dsp:style>
-      <dsp:txBody>
-        <a:bodyPr spcFirstLastPara="0" vert="horz" wrap="square" lIns="256032" tIns="256032" rIns="256032" bIns="256032" numCol="1" spcCol="1270" anchor="t" anchorCtr="0">
-          <a:noAutofit/>
-        </a:bodyPr>
-        <a:lstStyle/>
-        <a:p>
-          <a:pPr marL="0" lvl="0" indent="0" algn="ctr" defTabSz="1600200">
-            <a:lnSpc>
-              <a:spcPct val="90000"/>
-            </a:lnSpc>
-            <a:spcBef>
-              <a:spcPct val="0"/>
-            </a:spcBef>
-            <a:spcAft>
-              <a:spcPct val="35000"/>
-            </a:spcAft>
-            <a:buNone/>
-          </a:pPr>
-          <a:r>
-            <a:rPr lang="pl-PL" sz="3600" kern="1200" dirty="0"/>
-            <a:t>Was</a:t>
-          </a:r>
-        </a:p>
-      </dsp:txBody>
-      <dsp:txXfrm rot="10800000">
-        <a:off x="2943627" y="2438400"/>
-        <a:ext cx="2240746" cy="2906839"/>
-      </dsp:txXfrm>
-    </dsp:sp>
-    <dsp:sp modelId="{81B2DFD7-652D-4F4D-A4A5-CBAE188262BC}">
-      <dsp:nvSpPr>
-        <dsp:cNvPr id="0" name=""/>
-        <dsp:cNvSpPr/>
-      </dsp:nvSpPr>
-      <dsp:spPr>
-        <a:xfrm>
-          <a:off x="5496559" y="325120"/>
-          <a:ext cx="2387600" cy="1788160"/>
-        </a:xfrm>
-        <a:prstGeom prst="roundRect">
-          <a:avLst>
-            <a:gd name="adj" fmla="val 10000"/>
-          </a:avLst>
-        </a:prstGeom>
-        <a:solidFill>
-          <a:schemeClr val="accent1">
-            <a:tint val="50000"/>
-            <a:hueOff val="0"/>
-            <a:satOff val="0"/>
-            <a:lumOff val="0"/>
-            <a:alphaOff val="0"/>
-          </a:schemeClr>
-        </a:solidFill>
-        <a:ln w="12700" cap="flat" cmpd="sng" algn="ctr">
-          <a:solidFill>
-            <a:schemeClr val="lt1">
-              <a:hueOff val="0"/>
-              <a:satOff val="0"/>
-              <a:lumOff val="0"/>
-              <a:alphaOff val="0"/>
-            </a:schemeClr>
-          </a:solidFill>
-          <a:prstDash val="solid"/>
-          <a:miter lim="800000"/>
-        </a:ln>
-        <a:effectLst/>
-      </dsp:spPr>
-      <dsp:style>
-        <a:lnRef idx="2">
-          <a:scrgbClr r="0" g="0" b="0"/>
-        </a:lnRef>
-        <a:fillRef idx="1">
-          <a:scrgbClr r="0" g="0" b="0"/>
-        </a:fillRef>
-        <a:effectRef idx="0">
-          <a:scrgbClr r="0" g="0" b="0"/>
-        </a:effectRef>
-        <a:fontRef idx="minor"/>
-      </dsp:style>
-    </dsp:sp>
-    <dsp:sp modelId="{C9CAFAFD-1363-4AD2-9D39-08D524924E96}">
-      <dsp:nvSpPr>
-        <dsp:cNvPr id="0" name=""/>
-        <dsp:cNvSpPr/>
-      </dsp:nvSpPr>
-      <dsp:spPr>
-        <a:xfrm rot="10800000">
-          <a:off x="5496559" y="2438400"/>
-          <a:ext cx="2387600" cy="2980266"/>
-        </a:xfrm>
-        <a:prstGeom prst="round2SameRect">
-          <a:avLst>
-            <a:gd name="adj1" fmla="val 10500"/>
-            <a:gd name="adj2" fmla="val 0"/>
-          </a:avLst>
-        </a:prstGeom>
-        <a:solidFill>
-          <a:schemeClr val="accent1">
-            <a:hueOff val="0"/>
-            <a:satOff val="0"/>
-            <a:lumOff val="0"/>
-            <a:alphaOff val="0"/>
-          </a:schemeClr>
-        </a:solidFill>
-        <a:ln w="12700" cap="flat" cmpd="sng" algn="ctr">
-          <a:solidFill>
-            <a:schemeClr val="lt1">
-              <a:hueOff val="0"/>
-              <a:satOff val="0"/>
-              <a:lumOff val="0"/>
-              <a:alphaOff val="0"/>
-            </a:schemeClr>
-          </a:solidFill>
-          <a:prstDash val="solid"/>
-          <a:miter lim="800000"/>
-        </a:ln>
-        <a:effectLst/>
-      </dsp:spPr>
-      <dsp:style>
-        <a:lnRef idx="2">
-          <a:scrgbClr r="0" g="0" b="0"/>
-        </a:lnRef>
-        <a:fillRef idx="1">
-          <a:scrgbClr r="0" g="0" b="0"/>
-        </a:fillRef>
-        <a:effectRef idx="0">
-          <a:scrgbClr r="0" g="0" b="0"/>
-        </a:effectRef>
-        <a:fontRef idx="minor">
-          <a:schemeClr val="lt1"/>
-        </a:fontRef>
-      </dsp:style>
-      <dsp:txBody>
-        <a:bodyPr spcFirstLastPara="0" vert="horz" wrap="square" lIns="256032" tIns="256032" rIns="256032" bIns="256032" numCol="1" spcCol="1270" anchor="t" anchorCtr="0">
-          <a:noAutofit/>
-        </a:bodyPr>
-        <a:lstStyle/>
-        <a:p>
-          <a:pPr marL="0" lvl="0" indent="0" algn="ctr" defTabSz="1600200">
-            <a:lnSpc>
-              <a:spcPct val="90000"/>
-            </a:lnSpc>
-            <a:spcBef>
-              <a:spcPct val="0"/>
-            </a:spcBef>
-            <a:spcAft>
-              <a:spcPct val="35000"/>
-            </a:spcAft>
-            <a:buNone/>
-          </a:pPr>
-          <a:r>
-            <a:rPr lang="pl-PL" sz="3600" kern="1200" dirty="0" err="1"/>
-            <a:t>Mirrored</a:t>
-          </a:r>
-          <a:endParaRPr lang="pl-PL" sz="3600" kern="1200" dirty="0"/>
-        </a:p>
-      </dsp:txBody>
-      <dsp:txXfrm rot="10800000">
-        <a:off x="5569986" y="2438400"/>
-        <a:ext cx="2240746" cy="2906839"/>
-      </dsp:txXfrm>
-    </dsp:sp>
-  </dsp:spTree>
-</dsp:drawing>
-</file>
-
-<file path=ppt/diagrams/layout1.xml><?xml version="1.0" encoding="utf-8"?>
-<dgm:layoutDef xmlns:dgm="http://schemas.openxmlformats.org/drawingml/2006/diagram" xmlns:a="http://schemas.openxmlformats.org/drawingml/2006/main" uniqueId="urn:microsoft.com/office/officeart/2005/8/layout/pList2">
-  <dgm:title val=""/>
-  <dgm:desc val=""/>
-  <dgm:catLst>
-    <dgm:cat type="list" pri="11000"/>
-    <dgm:cat type="picture" pri="24000"/>
-    <dgm:cat type="pictureconvert" pri="24000"/>
-  </dgm:catLst>
-  <dgm:sampData useDef="1">
-    <dgm:dataModel>
-      <dgm:ptLst/>
-      <dgm:bg/>
-      <dgm:whole/>
-    </dgm:dataModel>
-  </dgm:sampData>
-  <dgm:styleData>
-    <dgm:dataModel>
-      <dgm:ptLst>
-        <dgm:pt modelId="0" type="doc"/>
-        <dgm:pt modelId="1"/>
-        <dgm:pt modelId="2"/>
-      </dgm:ptLst>
-      <dgm:cxnLst>
-        <dgm:cxn modelId="3" srcId="0" destId="1" srcOrd="0" destOrd="0"/>
-        <dgm:cxn modelId="4" srcId="0" destId="2" srcOrd="1" destOrd="0"/>
-      </dgm:cxnLst>
-      <dgm:bg/>
-      <dgm:whole/>
-    </dgm:dataModel>
-  </dgm:styleData>
-  <dgm:clrData>
-    <dgm:dataModel>
-      <dgm:ptLst>
-        <dgm:pt modelId="0" type="doc"/>
-        <dgm:pt modelId="1"/>
-        <dgm:pt modelId="2"/>
-        <dgm:pt modelId="3"/>
-        <dgm:pt modelId="4"/>
-      </dgm:ptLst>
-      <dgm:cxnLst>
-        <dgm:cxn modelId="5" srcId="0" destId="1" srcOrd="0" destOrd="0"/>
-        <dgm:cxn modelId="6" srcId="0" destId="2" srcOrd="1" destOrd="0"/>
-        <dgm:cxn modelId="7" srcId="0" destId="3" srcOrd="2" destOrd="0"/>
-        <dgm:cxn modelId="8" srcId="0" destId="4" srcOrd="3" destOrd="0"/>
-      </dgm:cxnLst>
-      <dgm:bg/>
-      <dgm:whole/>
-    </dgm:dataModel>
-  </dgm:clrData>
-  <dgm:layoutNode name="Name0">
-    <dgm:varLst>
-      <dgm:dir/>
-      <dgm:resizeHandles val="exact"/>
-    </dgm:varLst>
-    <dgm:alg type="composite"/>
-    <dgm:shape xmlns:r="http://schemas.openxmlformats.org/officeDocument/2006/relationships" r:blip="">
-      <dgm:adjLst/>
-    </dgm:shape>
-    <dgm:presOf/>
-    <dgm:constrLst>
-      <dgm:constr type="w" for="ch" forName="bkgdShp" refType="w"/>
-      <dgm:constr type="h" for="ch" forName="bkgdShp" refType="h" fact="0.45"/>
-      <dgm:constr type="t" for="ch" forName="bkgdShp"/>
-      <dgm:constr type="w" for="ch" forName="linComp" refType="w" fact="0.94"/>
-      <dgm:constr type="h" for="ch" forName="linComp" refType="h"/>
-      <dgm:constr type="ctrX" for="ch" forName="linComp" refType="w" fact="0.5"/>
-    </dgm:constrLst>
-    <dgm:ruleLst/>
-    <dgm:choose name="Name1">
-      <dgm:if name="Name2" axis="ch" ptType="node" func="cnt" op="gte" val="1">
-        <dgm:layoutNode name="bkgdShp" styleLbl="alignAccFollowNode1">
-          <dgm:alg type="sp"/>
-          <dgm:shape xmlns:r="http://schemas.openxmlformats.org/officeDocument/2006/relationships" type="roundRect" r:blip="">
-            <dgm:adjLst>
-              <dgm:adj idx="1" val="0.1"/>
-            </dgm:adjLst>
-          </dgm:shape>
-          <dgm:presOf/>
-          <dgm:constrLst/>
-          <dgm:ruleLst/>
-        </dgm:layoutNode>
-        <dgm:layoutNode name="linComp">
-          <dgm:choose name="Name3">
-            <dgm:if name="Name4" func="var" arg="dir" op="equ" val="norm">
-              <dgm:alg type="lin"/>
-            </dgm:if>
-            <dgm:else name="Name5">
-              <dgm:alg type="lin">
-                <dgm:param type="linDir" val="fromR"/>
-              </dgm:alg>
-            </dgm:else>
-          </dgm:choose>
-          <dgm:shape xmlns:r="http://schemas.openxmlformats.org/officeDocument/2006/relationships" r:blip="">
-            <dgm:adjLst/>
-          </dgm:shape>
-          <dgm:presOf/>
-          <dgm:constrLst>
-            <dgm:constr type="w" for="ch" forName="compNode" refType="w"/>
-            <dgm:constr type="h" for="ch" forName="compNode" refType="h"/>
-            <dgm:constr type="w" for="ch" ptType="sibTrans" refType="w" refFor="ch" refForName="compNode" fact="0.1"/>
-            <dgm:constr type="h" for="ch" ptType="sibTrans" op="equ"/>
-            <dgm:constr type="h" for="ch" forName="compNode" op="equ"/>
-            <dgm:constr type="primFontSz" for="des" forName="node" op="equ"/>
-          </dgm:constrLst>
-          <dgm:ruleLst/>
-          <dgm:forEach name="nodesForEach" axis="ch" ptType="node">
-            <dgm:layoutNode name="compNode">
-              <dgm:alg type="composite"/>
-              <dgm:shape xmlns:r="http://schemas.openxmlformats.org/officeDocument/2006/relationships" r:blip="">
-                <dgm:adjLst/>
-              </dgm:shape>
-              <dgm:presOf/>
-              <dgm:constrLst>
-                <dgm:constr type="w" for="ch" forName="node" refType="w"/>
-                <dgm:constr type="h" for="ch" forName="node" refType="h" fact="0.55"/>
-                <dgm:constr type="b" for="ch" forName="node" refType="h"/>
-                <dgm:constr type="w" for="ch" forName="invisiNode" refType="w" fact="0.75"/>
-                <dgm:constr type="h" for="ch" forName="invisiNode" refType="h" fact="0.06"/>
-                <dgm:constr type="t" for="ch" forName="invisiNode"/>
-                <dgm:constr type="w" for="ch" forName="imagNode" refType="w"/>
-                <dgm:constr type="h" for="ch" forName="imagNode" refType="h" fact="0.33"/>
-                <dgm:constr type="ctrX" for="ch" forName="imagNode" refType="w" fact="0.5"/>
-                <dgm:constr type="t" for="ch" forName="imagNode" refType="h" fact="0.06"/>
-              </dgm:constrLst>
-              <dgm:ruleLst/>
-              <dgm:layoutNode name="node" styleLbl="node1">
-                <dgm:varLst>
-                  <dgm:bulletEnabled val="1"/>
-                </dgm:varLst>
-                <dgm:alg type="tx">
-                  <dgm:param type="txAnchorVert" val="t"/>
-                </dgm:alg>
-                <dgm:shape xmlns:r="http://schemas.openxmlformats.org/officeDocument/2006/relationships" rot="180" type="round2SameRect" r:blip="">
-                  <dgm:adjLst>
-                    <dgm:adj idx="1" val="0.105"/>
-                  </dgm:adjLst>
-                </dgm:shape>
-                <dgm:presOf axis="desOrSelf" ptType="node"/>
-                <dgm:constrLst>
-                  <dgm:constr type="primFontSz" val="65"/>
-                </dgm:constrLst>
-                <dgm:ruleLst>
-                  <dgm:rule type="primFontSz" val="5" fact="NaN" max="NaN"/>
-                </dgm:ruleLst>
-              </dgm:layoutNode>
-              <dgm:layoutNode name="invisiNode">
-                <dgm:alg type="sp"/>
-                <dgm:shape xmlns:r="http://schemas.openxmlformats.org/officeDocument/2006/relationships" type="roundRect" r:blip="" hideGeom="1">
-                  <dgm:adjLst>
-                    <dgm:adj idx="1" val="0.1"/>
-                  </dgm:adjLst>
-                </dgm:shape>
-                <dgm:presOf/>
-                <dgm:constrLst/>
-                <dgm:ruleLst/>
-              </dgm:layoutNode>
-              <dgm:layoutNode name="imagNode" styleLbl="fgImgPlace1">
-                <dgm:alg type="sp"/>
-                <dgm:shape xmlns:r="http://schemas.openxmlformats.org/officeDocument/2006/relationships" type="roundRect" r:blip="" zOrderOff="-2" blipPhldr="1">
-                  <dgm:adjLst>
-                    <dgm:adj idx="1" val="0.1"/>
-                  </dgm:adjLst>
-                </dgm:shape>
-                <dgm:presOf/>
-                <dgm:constrLst/>
-                <dgm:ruleLst/>
-              </dgm:layoutNode>
-            </dgm:layoutNode>
-            <dgm:forEach name="sibTransForEach" axis="followSib" ptType="sibTrans" cnt="1">
-              <dgm:layoutNode name="sibTrans">
-                <dgm:alg type="sp"/>
-                <dgm:shape xmlns:r="http://schemas.openxmlformats.org/officeDocument/2006/relationships" type="rect" r:blip="" hideGeom="1">
-                  <dgm:adjLst/>
-                </dgm:shape>
-                <dgm:presOf axis="self"/>
-                <dgm:constrLst/>
-                <dgm:ruleLst/>
-              </dgm:layoutNode>
-            </dgm:forEach>
-          </dgm:forEach>
-        </dgm:layoutNode>
-      </dgm:if>
-      <dgm:else name="Name6"/>
-    </dgm:choose>
-  </dgm:layoutNode>
-</dgm:layoutDef>
-</file>
-
-<file path=ppt/diagrams/quickStyle1.xml><?xml version="1.0" encoding="utf-8"?>
-<dgm:styleDef xmlns:dgm="http://schemas.openxmlformats.org/drawingml/2006/diagram" xmlns:a="http://schemas.openxmlformats.org/drawingml/2006/main" uniqueId="urn:microsoft.com/office/officeart/2005/8/quickstyle/simple1">
-  <dgm:title val=""/>
-  <dgm:desc val=""/>
-  <dgm:catLst>
-    <dgm:cat type="simple" pri="10100"/>
-  </dgm:catLst>
-  <dgm:scene3d>
-    <a:camera prst="orthographicFront"/>
-    <a:lightRig rig="threePt" dir="t"/>
-  </dgm:scene3d>
-  <dgm:styleLbl name="node0">
-    <dgm:scene3d>
-      <a:camera prst="orthographicFront"/>
-      <a:lightRig rig="threePt" dir="t"/>
-    </dgm:scene3d>
-    <dgm:sp3d/>
-    <dgm:txPr/>
-    <dgm:style>
-      <a:lnRef idx="2">
-        <a:scrgbClr r="0" g="0" b="0"/>
-      </a:lnRef>
-      <a:fillRef idx="1">
-        <a:scrgbClr r="0" g="0" b="0"/>
-      </a:fillRef>
-      <a:effectRef idx="0">
-        <a:scrgbClr r="0" g="0" b="0"/>
-      </a:effectRef>
-      <a:fontRef idx="minor">
-        <a:schemeClr val="lt1"/>
-      </a:fontRef>
-    </dgm:style>
-  </dgm:styleLbl>
-  <dgm:styleLbl name="lnNode1">
-    <dgm:scene3d>
-      <a:camera prst="orthographicFront"/>
-      <a:lightRig rig="threePt" dir="t"/>
-    </dgm:scene3d>
-    <dgm:sp3d/>
-    <dgm:txPr/>
-    <dgm:style>
-      <a:lnRef idx="2">
-        <a:scrgbClr r="0" g="0" b="0"/>
-      </a:lnRef>
-      <a:fillRef idx="1">
-        <a:scrgbClr r="0" g="0" b="0"/>
-      </a:fillRef>
-      <a:effectRef idx="0">
-        <a:scrgbClr r="0" g="0" b="0"/>
-      </a:effectRef>
-      <a:fontRef idx="minor">
-        <a:schemeClr val="lt1"/>
-      </a:fontRef>
-    </dgm:style>
-  </dgm:styleLbl>
-  <dgm:styleLbl name="vennNode1">
-    <dgm:scene3d>
-      <a:camera prst="orthographicFront"/>
-      <a:lightRig rig="threePt" dir="t"/>
-    </dgm:scene3d>
-    <dgm:sp3d/>
-    <dgm:txPr/>
-    <dgm:style>
-      <a:lnRef idx="2">
-        <a:scrgbClr r="0" g="0" b="0"/>
-      </a:lnRef>
-      <a:fillRef idx="1">
-        <a:scrgbClr r="0" g="0" b="0"/>
-      </a:fillRef>
-      <a:effectRef idx="0">
-        <a:scrgbClr r="0" g="0" b="0"/>
-      </a:effectRef>
-      <a:fontRef idx="minor">
-        <a:schemeClr val="tx1"/>
-      </a:fontRef>
-    </dgm:style>
-  </dgm:styleLbl>
-  <dgm:styleLbl name="alignNode1">
-    <dgm:scene3d>
-      <a:camera prst="orthographicFront"/>
-      <a:lightRig rig="threePt" dir="t"/>
-    </dgm:scene3d>
-    <dgm:sp3d/>
-    <dgm:txPr/>
-    <dgm:style>
-      <a:lnRef idx="2">
-        <a:scrgbClr r="0" g="0" b="0"/>
-      </a:lnRef>
-      <a:fillRef idx="1">
-        <a:scrgbClr r="0" g="0" b="0"/>
-      </a:fillRef>
-      <a:effectRef idx="0">
-        <a:scrgbClr r="0" g="0" b="0"/>
-      </a:effectRef>
-      <a:fontRef idx="minor">
-        <a:schemeClr val="lt1"/>
-      </a:fontRef>
-    </dgm:style>
-  </dgm:styleLbl>
-  <dgm:styleLbl name="node1">
-    <dgm:scene3d>
-      <a:camera prst="orthographicFront"/>
-      <a:lightRig rig="threePt" dir="t"/>
-    </dgm:scene3d>
-    <dgm:sp3d/>
-    <dgm:txPr/>
-    <dgm:style>
-      <a:lnRef idx="2">
-        <a:scrgbClr r="0" g="0" b="0"/>
-      </a:lnRef>
-      <a:fillRef idx="1">
-        <a:scrgbClr r="0" g="0" b="0"/>
-      </a:fillRef>
-      <a:effectRef idx="0">
-        <a:scrgbClr r="0" g="0" b="0"/>
-      </a:effectRef>
-      <a:fontRef idx="minor">
-        <a:schemeClr val="lt1"/>
-      </a:fontRef>
-    </dgm:style>
-  </dgm:styleLbl>
-  <dgm:styleLbl name="node2">
-    <dgm:scene3d>
-      <a:camera prst="orthographicFront"/>
-      <a:lightRig rig="threePt" dir="t"/>
-    </dgm:scene3d>
-    <dgm:sp3d/>
-    <dgm:txPr/>
-    <dgm:style>
-      <a:lnRef idx="2">
-        <a:scrgbClr r="0" g="0" b="0"/>
-      </a:lnRef>
-      <a:fillRef idx="1">
-        <a:scrgbClr r="0" g="0" b="0"/>
-      </a:fillRef>
-      <a:effectRef idx="0">
-        <a:scrgbClr r="0" g="0" b="0"/>
-      </a:effectRef>
-      <a:fontRef idx="minor">
-        <a:schemeClr val="lt1"/>
-      </a:fontRef>
-    </dgm:style>
-  </dgm:styleLbl>
-  <dgm:styleLbl name="node3">
-    <dgm:scene3d>
-      <a:camera prst="orthographicFront"/>
-      <a:lightRig rig="threePt" dir="t"/>
-    </dgm:scene3d>
-    <dgm:sp3d/>
-    <dgm:txPr/>
-    <dgm:style>
-      <a:lnRef idx="2">
-        <a:scrgbClr r="0" g="0" b="0"/>
-      </a:lnRef>
-      <a:fillRef idx="1">
-        <a:scrgbClr r="0" g="0" b="0"/>
-      </a:fillRef>
-      <a:effectRef idx="0">
-        <a:scrgbClr r="0" g="0" b="0"/>
-      </a:effectRef>
-      <a:fontRef idx="minor">
-        <a:schemeClr val="lt1"/>
-      </a:fontRef>
-    </dgm:style>
-  </dgm:styleLbl>
-  <dgm:styleLbl name="node4">
-    <dgm:scene3d>
-      <a:camera prst="orthographicFront"/>
-      <a:lightRig rig="threePt" dir="t"/>
-    </dgm:scene3d>
-    <dgm:sp3d/>
-    <dgm:txPr/>
-    <dgm:style>
-      <a:lnRef idx="2">
-        <a:scrgbClr r="0" g="0" b="0"/>
-      </a:lnRef>
-      <a:fillRef idx="1">
-        <a:scrgbClr r="0" g="0" b="0"/>
-      </a:fillRef>
-      <a:effectRef idx="0">
-        <a:scrgbClr r="0" g="0" b="0"/>
-      </a:effectRef>
-      <a:fontRef idx="minor">
-        <a:schemeClr val="lt1"/>
-      </a:fontRef>
-    </dgm:style>
-  </dgm:styleLbl>
-  <dgm:styleLbl name="fgImgPlace1">
-    <dgm:scene3d>
-      <a:camera prst="orthographicFront"/>
-      <a:lightRig rig="threePt" dir="t"/>
-    </dgm:scene3d>
-    <dgm:sp3d/>
-    <dgm:txPr/>
-    <dgm:style>
-      <a:lnRef idx="2">
-        <a:scrgbClr r="0" g="0" b="0"/>
-      </a:lnRef>
-      <a:fillRef idx="1">
-        <a:scrgbClr r="0" g="0" b="0"/>
-      </a:fillRef>
-      <a:effectRef idx="0">
-        <a:scrgbClr r="0" g="0" b="0"/>
-      </a:effectRef>
-      <a:fontRef idx="minor"/>
-    </dgm:style>
-  </dgm:styleLbl>
-  <dgm:styleLbl name="alignImgPlace1">
-    <dgm:scene3d>
-      <a:camera prst="orthographicFront"/>
-      <a:lightRig rig="threePt" dir="t"/>
-    </dgm:scene3d>
-    <dgm:sp3d/>
-    <dgm:txPr/>
-    <dgm:style>
-      <a:lnRef idx="2">
-        <a:scrgbClr r="0" g="0" b="0"/>
-      </a:lnRef>
-      <a:fillRef idx="1">
-        <a:scrgbClr r="0" g="0" b="0"/>
-      </a:fillRef>
-      <a:effectRef idx="0">
-        <a:scrgbClr r="0" g="0" b="0"/>
-      </a:effectRef>
-      <a:fontRef idx="minor"/>
-    </dgm:style>
-  </dgm:styleLbl>
-  <dgm:styleLbl name="bgImgPlace1">
-    <dgm:scene3d>
-      <a:camera prst="orthographicFront"/>
-      <a:lightRig rig="threePt" dir="t"/>
-    </dgm:scene3d>
-    <dgm:sp3d/>
-    <dgm:txPr/>
-    <dgm:style>
-      <a:lnRef idx="2">
-        <a:scrgbClr r="0" g="0" b="0"/>
-      </a:lnRef>
-      <a:fillRef idx="1">
-        <a:scrgbClr r="0" g="0" b="0"/>
-      </a:fillRef>
-      <a:effectRef idx="0">
-        <a:scrgbClr r="0" g="0" b="0"/>
-      </a:effectRef>
-      <a:fontRef idx="minor"/>
-    </dgm:style>
-  </dgm:styleLbl>
-  <dgm:styleLbl name="sibTrans2D1">
-    <dgm:scene3d>
-      <a:camera prst="orthographicFront"/>
-      <a:lightRig rig="threePt" dir="t"/>
-    </dgm:scene3d>
-    <dgm:sp3d/>
-    <dgm:txPr/>
-    <dgm:style>
-      <a:lnRef idx="0">
-        <a:scrgbClr r="0" g="0" b="0"/>
-      </a:lnRef>
-      <a:fillRef idx="1">
-        <a:scrgbClr r="0" g="0" b="0"/>
-      </a:fillRef>
-      <a:effectRef idx="0">
-        <a:scrgbClr r="0" g="0" b="0"/>
-      </a:effectRef>
-      <a:fontRef idx="minor">
-        <a:schemeClr val="lt1"/>
-      </a:fontRef>
-    </dgm:style>
-  </dgm:styleLbl>
-  <dgm:styleLbl name="fgSibTrans2D1">
-    <dgm:scene3d>
-      <a:camera prst="orthographicFront"/>
-      <a:lightRig rig="threePt" dir="t"/>
-    </dgm:scene3d>
-    <dgm:sp3d/>
-    <dgm:txPr/>
-    <dgm:style>
-      <a:lnRef idx="0">
-        <a:scrgbClr r="0" g="0" b="0"/>
-      </a:lnRef>
-      <a:fillRef idx="1">
-        <a:scrgbClr r="0" g="0" b="0"/>
-      </a:fillRef>
-      <a:effectRef idx="0">
-        <a:scrgbClr r="0" g="0" b="0"/>
-      </a:effectRef>
-      <a:fontRef idx="minor">
-        <a:schemeClr val="lt1"/>
-      </a:fontRef>
-    </dgm:style>
-  </dgm:styleLbl>
-  <dgm:styleLbl name="bgSibTrans2D1">
-    <dgm:scene3d>
-      <a:camera prst="orthographicFront"/>
-      <a:lightRig rig="threePt" dir="t"/>
-    </dgm:scene3d>
-    <dgm:sp3d/>
-    <dgm:txPr/>
-    <dgm:style>
-      <a:lnRef idx="0">
-        <a:scrgbClr r="0" g="0" b="0"/>
-      </a:lnRef>
-      <a:fillRef idx="1">
-        <a:scrgbClr r="0" g="0" b="0"/>
-      </a:fillRef>
-      <a:effectRef idx="0">
-        <a:scrgbClr r="0" g="0" b="0"/>
-      </a:effectRef>
-      <a:fontRef idx="minor">
-        <a:schemeClr val="lt1"/>
-      </a:fontRef>
-    </dgm:style>
-  </dgm:styleLbl>
-  <dgm:styleLbl name="sibTrans1D1">
-    <dgm:scene3d>
-      <a:camera prst="orthographicFront"/>
-      <a:lightRig rig="threePt" dir="t"/>
-    </dgm:scene3d>
-    <dgm:sp3d/>
-    <dgm:txPr/>
-    <dgm:style>
-      <a:lnRef idx="1">
-        <a:scrgbClr r="0" g="0" b="0"/>
-      </a:lnRef>
-      <a:fillRef idx="0">
-        <a:scrgbClr r="0" g="0" b="0"/>
-      </a:fillRef>
-      <a:effectRef idx="0">
-        <a:scrgbClr r="0" g="0" b="0"/>
-      </a:effectRef>
-      <a:fontRef idx="minor"/>
-    </dgm:style>
-  </dgm:styleLbl>
-  <dgm:styleLbl name="callout">
-    <dgm:scene3d>
-      <a:camera prst="orthographicFront"/>
-      <a:lightRig rig="threePt" dir="t"/>
-    </dgm:scene3d>
-    <dgm:sp3d/>
-    <dgm:txPr/>
-    <dgm:style>
-      <a:lnRef idx="2">
-        <a:scrgbClr r="0" g="0" b="0"/>
-      </a:lnRef>
-      <a:fillRef idx="1">
-        <a:scrgbClr r="0" g="0" b="0"/>
-      </a:fillRef>
-      <a:effectRef idx="0">
-        <a:scrgbClr r="0" g="0" b="0"/>
-      </a:effectRef>
-      <a:fontRef idx="minor"/>
-    </dgm:style>
-  </dgm:styleLbl>
-  <dgm:styleLbl name="asst0">
-    <dgm:scene3d>
-      <a:camera prst="orthographicFront"/>
-      <a:lightRig rig="threePt" dir="t"/>
-    </dgm:scene3d>
-    <dgm:sp3d/>
-    <dgm:txPr/>
-    <dgm:style>
-      <a:lnRef idx="2">
-        <a:scrgbClr r="0" g="0" b="0"/>
-      </a:lnRef>
-      <a:fillRef idx="1">
-        <a:scrgbClr r="0" g="0" b="0"/>
-      </a:fillRef>
-      <a:effectRef idx="0">
-        <a:scrgbClr r="0" g="0" b="0"/>
-      </a:effectRef>
-      <a:fontRef idx="minor">
-        <a:schemeClr val="lt1"/>
-      </a:fontRef>
-    </dgm:style>
-  </dgm:styleLbl>
-  <dgm:styleLbl name="asst1">
-    <dgm:scene3d>
-      <a:camera prst="orthographicFront"/>
-      <a:lightRig rig="threePt" dir="t"/>
-    </dgm:scene3d>
-    <dgm:sp3d/>
-    <dgm:txPr/>
-    <dgm:style>
-      <a:lnRef idx="2">
-        <a:scrgbClr r="0" g="0" b="0"/>
-      </a:lnRef>
-      <a:fillRef idx="1">
-        <a:scrgbClr r="0" g="0" b="0"/>
-      </a:fillRef>
-      <a:effectRef idx="0">
-        <a:scrgbClr r="0" g="0" b="0"/>
-      </a:effectRef>
-      <a:fontRef idx="minor">
-        <a:schemeClr val="lt1"/>
-      </a:fontRef>
-    </dgm:style>
-  </dgm:styleLbl>
-  <dgm:styleLbl name="asst2">
-    <dgm:scene3d>
-      <a:camera prst="orthographicFront"/>
-      <a:lightRig rig="threePt" dir="t"/>
-    </dgm:scene3d>
-    <dgm:sp3d/>
-    <dgm:txPr/>
-    <dgm:style>
-      <a:lnRef idx="2">
-        <a:scrgbClr r="0" g="0" b="0"/>
-      </a:lnRef>
-      <a:fillRef idx="1">
-        <a:scrgbClr r="0" g="0" b="0"/>
-      </a:fillRef>
-      <a:effectRef idx="0">
-        <a:scrgbClr r="0" g="0" b="0"/>
-      </a:effectRef>
-      <a:fontRef idx="minor">
-        <a:schemeClr val="lt1"/>
-      </a:fontRef>
-    </dgm:style>
-  </dgm:styleLbl>
-  <dgm:styleLbl name="asst3">
-    <dgm:scene3d>
-      <a:camera prst="orthographicFront"/>
-      <a:lightRig rig="threePt" dir="t"/>
-    </dgm:scene3d>
-    <dgm:sp3d/>
-    <dgm:txPr/>
-    <dgm:style>
-      <a:lnRef idx="2">
-        <a:scrgbClr r="0" g="0" b="0"/>
-      </a:lnRef>
-      <a:fillRef idx="1">
-        <a:scrgbClr r="0" g="0" b="0"/>
-      </a:fillRef>
-      <a:effectRef idx="0">
-        <a:scrgbClr r="0" g="0" b="0"/>
-      </a:effectRef>
-      <a:fontRef idx="minor">
-        <a:schemeClr val="lt1"/>
-      </a:fontRef>
-    </dgm:style>
-  </dgm:styleLbl>
-  <dgm:styleLbl name="asst4">
-    <dgm:scene3d>
-      <a:camera prst="orthographicFront"/>
-      <a:lightRig rig="threePt" dir="t"/>
-    </dgm:scene3d>
-    <dgm:sp3d/>
-    <dgm:txPr/>
-    <dgm:style>
-      <a:lnRef idx="2">
-        <a:scrgbClr r="0" g="0" b="0"/>
-      </a:lnRef>
-      <a:fillRef idx="1">
-        <a:scrgbClr r="0" g="0" b="0"/>
-      </a:fillRef>
-      <a:effectRef idx="0">
-        <a:scrgbClr r="0" g="0" b="0"/>
-      </a:effectRef>
-      <a:fontRef idx="minor">
-        <a:schemeClr val="lt1"/>
-      </a:fontRef>
-    </dgm:style>
-  </dgm:styleLbl>
-  <dgm:styleLbl name="parChTrans2D1">
-    <dgm:scene3d>
-      <a:camera prst="orthographicFront"/>
-      <a:lightRig rig="threePt" dir="t"/>
-    </dgm:scene3d>
-    <dgm:sp3d/>
-    <dgm:txPr/>
-    <dgm:style>
-      <a:lnRef idx="2">
-        <a:scrgbClr r="0" g="0" b="0"/>
-      </a:lnRef>
-      <a:fillRef idx="1">
-        <a:scrgbClr r="0" g="0" b="0"/>
-      </a:fillRef>
-      <a:effectRef idx="0">
-        <a:scrgbClr r="0" g="0" b="0"/>
-      </a:effectRef>
-      <a:fontRef idx="minor">
-        <a:schemeClr val="lt1"/>
-      </a:fontRef>
-    </dgm:style>
-  </dgm:styleLbl>
-  <dgm:styleLbl name="parChTrans2D2">
-    <dgm:scene3d>
-      <a:camera prst="orthographicFront"/>
-      <a:lightRig rig="threePt" dir="t"/>
-    </dgm:scene3d>
-    <dgm:sp3d/>
-    <dgm:txPr/>
-    <dgm:style>
-      <a:lnRef idx="2">
-        <a:scrgbClr r="0" g="0" b="0"/>
-      </a:lnRef>
-      <a:fillRef idx="1">
-        <a:scrgbClr r="0" g="0" b="0"/>
-      </a:fillRef>
-      <a:effectRef idx="0">
-        <a:scrgbClr r="0" g="0" b="0"/>
-      </a:effectRef>
-      <a:fontRef idx="minor">
-        <a:schemeClr val="lt1"/>
-      </a:fontRef>
-    </dgm:style>
-  </dgm:styleLbl>
-  <dgm:styleLbl name="parChTrans2D3">
-    <dgm:scene3d>
-      <a:camera prst="orthographicFront"/>
-      <a:lightRig rig="threePt" dir="t"/>
-    </dgm:scene3d>
-    <dgm:sp3d/>
-    <dgm:txPr/>
-    <dgm:style>
-      <a:lnRef idx="2">
-        <a:scrgbClr r="0" g="0" b="0"/>
-      </a:lnRef>
-      <a:fillRef idx="1">
-        <a:scrgbClr r="0" g="0" b="0"/>
-      </a:fillRef>
-      <a:effectRef idx="0">
-        <a:scrgbClr r="0" g="0" b="0"/>
-      </a:effectRef>
-      <a:fontRef idx="minor">
-        <a:schemeClr val="lt1"/>
-      </a:fontRef>
-    </dgm:style>
-  </dgm:styleLbl>
-  <dgm:styleLbl name="parChTrans2D4">
-    <dgm:scene3d>
-      <a:camera prst="orthographicFront"/>
-      <a:lightRig rig="threePt" dir="t"/>
-    </dgm:scene3d>
-    <dgm:sp3d/>
-    <dgm:txPr/>
-    <dgm:style>
-      <a:lnRef idx="2">
-        <a:scrgbClr r="0" g="0" b="0"/>
-      </a:lnRef>
-      <a:fillRef idx="1">
-        <a:scrgbClr r="0" g="0" b="0"/>
-      </a:fillRef>
-      <a:effectRef idx="0">
-        <a:scrgbClr r="0" g="0" b="0"/>
-      </a:effectRef>
-      <a:fontRef idx="minor">
-        <a:schemeClr val="lt1"/>
-      </a:fontRef>
-    </dgm:style>
-  </dgm:styleLbl>
-  <dgm:styleLbl name="parChTrans1D1">
-    <dgm:scene3d>
-      <a:camera prst="orthographicFront"/>
-      <a:lightRig rig="threePt" dir="t"/>
-    </dgm:scene3d>
-    <dgm:sp3d/>
-    <dgm:txPr/>
-    <dgm:style>
-      <a:lnRef idx="2">
-        <a:scrgbClr r="0" g="0" b="0"/>
-      </a:lnRef>
-      <a:fillRef idx="0">
-        <a:scrgbClr r="0" g="0" b="0"/>
-      </a:fillRef>
-      <a:effectRef idx="0">
-        <a:scrgbClr r="0" g="0" b="0"/>
-      </a:effectRef>
-      <a:fontRef idx="minor"/>
-    </dgm:style>
-  </dgm:styleLbl>
-  <dgm:styleLbl name="parChTrans1D2">
-    <dgm:scene3d>
-      <a:camera prst="orthographicFront"/>
-      <a:lightRig rig="threePt" dir="t"/>
-    </dgm:scene3d>
-    <dgm:sp3d/>
-    <dgm:txPr/>
-    <dgm:style>
-      <a:lnRef idx="2">
-        <a:scrgbClr r="0" g="0" b="0"/>
-      </a:lnRef>
-      <a:fillRef idx="0">
-        <a:scrgbClr r="0" g="0" b="0"/>
-      </a:fillRef>
-      <a:effectRef idx="0">
-        <a:scrgbClr r="0" g="0" b="0"/>
-      </a:effectRef>
-      <a:fontRef idx="minor"/>
-    </dgm:style>
-  </dgm:styleLbl>
-  <dgm:styleLbl name="parChTrans1D3">
-    <dgm:scene3d>
-      <a:camera prst="orthographicFront"/>
-      <a:lightRig rig="threePt" dir="t"/>
-    </dgm:scene3d>
-    <dgm:sp3d/>
-    <dgm:txPr/>
-    <dgm:style>
-      <a:lnRef idx="2">
-        <a:scrgbClr r="0" g="0" b="0"/>
-      </a:lnRef>
-      <a:fillRef idx="0">
-        <a:scrgbClr r="0" g="0" b="0"/>
-      </a:fillRef>
-      <a:effectRef idx="0">
-        <a:scrgbClr r="0" g="0" b="0"/>
-      </a:effectRef>
-      <a:fontRef idx="minor"/>
-    </dgm:style>
-  </dgm:styleLbl>
-  <dgm:styleLbl name="parChTrans1D4">
-    <dgm:scene3d>
-      <a:camera prst="orthographicFront"/>
-      <a:lightRig rig="threePt" dir="t"/>
-    </dgm:scene3d>
-    <dgm:sp3d/>
-    <dgm:txPr/>
-    <dgm:style>
-      <a:lnRef idx="2">
-        <a:scrgbClr r="0" g="0" b="0"/>
-      </a:lnRef>
-      <a:fillRef idx="0">
-        <a:scrgbClr r="0" g="0" b="0"/>
-      </a:fillRef>
-      <a:effectRef idx="0">
-        <a:scrgbClr r="0" g="0" b="0"/>
-      </a:effectRef>
-      <a:fontRef idx="minor"/>
-    </dgm:style>
-  </dgm:styleLbl>
-  <dgm:styleLbl name="fgAcc1">
-    <dgm:scene3d>
-      <a:camera prst="orthographicFront"/>
-      <a:lightRig rig="threePt" dir="t"/>
-    </dgm:scene3d>
-    <dgm:sp3d/>
-    <dgm:txPr/>
-    <dgm:style>
-      <a:lnRef idx="2">
-        <a:scrgbClr r="0" g="0" b="0"/>
-      </a:lnRef>
-      <a:fillRef idx="1">
-        <a:scrgbClr r="0" g="0" b="0"/>
-      </a:fillRef>
-      <a:effectRef idx="0">
-        <a:scrgbClr r="0" g="0" b="0"/>
-      </a:effectRef>
-      <a:fontRef idx="minor"/>
-    </dgm:style>
-  </dgm:styleLbl>
-  <dgm:styleLbl name="conFgAcc1">
-    <dgm:scene3d>
-      <a:camera prst="orthographicFront"/>
-      <a:lightRig rig="threePt" dir="t"/>
-    </dgm:scene3d>
-    <dgm:sp3d/>
-    <dgm:txPr/>
-    <dgm:style>
-      <a:lnRef idx="2">
-        <a:scrgbClr r="0" g="0" b="0"/>
-      </a:lnRef>
-      <a:fillRef idx="1">
-        <a:scrgbClr r="0" g="0" b="0"/>
-      </a:fillRef>
-      <a:effectRef idx="0">
-        <a:scrgbClr r="0" g="0" b="0"/>
-      </a:effectRef>
-      <a:fontRef idx="minor"/>
-    </dgm:style>
-  </dgm:styleLbl>
-  <dgm:styleLbl name="alignAcc1">
-    <dgm:scene3d>
-      <a:camera prst="orthographicFront"/>
-      <a:lightRig rig="threePt" dir="t"/>
-    </dgm:scene3d>
-    <dgm:sp3d/>
-    <dgm:txPr/>
-    <dgm:style>
-      <a:lnRef idx="2">
-        <a:scrgbClr r="0" g="0" b="0"/>
-      </a:lnRef>
-      <a:fillRef idx="1">
-        <a:scrgbClr r="0" g="0" b="0"/>
-      </a:fillRef>
-      <a:effectRef idx="0">
-        <a:scrgbClr r="0" g="0" b="0"/>
-      </a:effectRef>
-      <a:fontRef idx="minor"/>
-    </dgm:style>
-  </dgm:styleLbl>
-  <dgm:styleLbl name="trAlignAcc1">
-    <dgm:scene3d>
-      <a:camera prst="orthographicFront"/>
-      <a:lightRig rig="threePt" dir="t"/>
-    </dgm:scene3d>
-    <dgm:sp3d/>
-    <dgm:txPr/>
-    <dgm:style>
-      <a:lnRef idx="1">
-        <a:scrgbClr r="0" g="0" b="0"/>
-      </a:lnRef>
-      <a:fillRef idx="1">
-        <a:scrgbClr r="0" g="0" b="0"/>
-      </a:fillRef>
-      <a:effectRef idx="0">
-        <a:scrgbClr r="0" g="0" b="0"/>
-      </a:effectRef>
-      <a:fontRef idx="minor"/>
-    </dgm:style>
-  </dgm:styleLbl>
-  <dgm:styleLbl name="bgAcc1">
-    <dgm:scene3d>
-      <a:camera prst="orthographicFront"/>
-      <a:lightRig rig="threePt" dir="t"/>
-    </dgm:scene3d>
-    <dgm:sp3d/>
-    <dgm:txPr/>
-    <dgm:style>
-      <a:lnRef idx="2">
-        <a:scrgbClr r="0" g="0" b="0"/>
-      </a:lnRef>
-      <a:fillRef idx="1">
-        <a:scrgbClr r="0" g="0" b="0"/>
-      </a:fillRef>
-      <a:effectRef idx="0">
-        <a:scrgbClr r="0" g="0" b="0"/>
-      </a:effectRef>
-      <a:fontRef idx="minor"/>
-    </dgm:style>
-  </dgm:styleLbl>
-  <dgm:styleLbl name="solidFgAcc1">
-    <dgm:scene3d>
-      <a:camera prst="orthographicFront"/>
-      <a:lightRig rig="threePt" dir="t"/>
-    </dgm:scene3d>
-    <dgm:sp3d/>
-    <dgm:txPr/>
-    <dgm:style>
-      <a:lnRef idx="2">
-        <a:scrgbClr r="0" g="0" b="0"/>
-      </a:lnRef>
-      <a:fillRef idx="1">
-        <a:scrgbClr r="0" g="0" b="0"/>
-      </a:fillRef>
-      <a:effectRef idx="0">
-        <a:scrgbClr r="0" g="0" b="0"/>
-      </a:effectRef>
-      <a:fontRef idx="minor"/>
-    </dgm:style>
-  </dgm:styleLbl>
-  <dgm:styleLbl name="solidAlignAcc1">
-    <dgm:scene3d>
-      <a:camera prst="orthographicFront"/>
-      <a:lightRig rig="threePt" dir="t"/>
-    </dgm:scene3d>
-    <dgm:sp3d/>
-    <dgm:txPr/>
-    <dgm:style>
-      <a:lnRef idx="2">
-        <a:scrgbClr r="0" g="0" b="0"/>
-      </a:lnRef>
-      <a:fillRef idx="1">
-        <a:scrgbClr r="0" g="0" b="0"/>
-      </a:fillRef>
-      <a:effectRef idx="0">
-        <a:scrgbClr r="0" g="0" b="0"/>
-      </a:effectRef>
-      <a:fontRef idx="minor"/>
-    </dgm:style>
-  </dgm:styleLbl>
-  <dgm:styleLbl name="solidBgAcc1">
-    <dgm:scene3d>
-      <a:camera prst="orthographicFront"/>
-      <a:lightRig rig="threePt" dir="t"/>
-    </dgm:scene3d>
-    <dgm:sp3d/>
-    <dgm:txPr/>
-    <dgm:style>
-      <a:lnRef idx="2">
-        <a:scrgbClr r="0" g="0" b="0"/>
-      </a:lnRef>
-      <a:fillRef idx="1">
-        <a:scrgbClr r="0" g="0" b="0"/>
-      </a:fillRef>
-      <a:effectRef idx="0">
-        <a:scrgbClr r="0" g="0" b="0"/>
-      </a:effectRef>
-      <a:fontRef idx="minor"/>
-    </dgm:style>
-  </dgm:styleLbl>
-  <dgm:styleLbl name="fgAccFollowNode1">
-    <dgm:scene3d>
-      <a:camera prst="orthographicFront"/>
-      <a:lightRig rig="threePt" dir="t"/>
-    </dgm:scene3d>
-    <dgm:sp3d/>
-    <dgm:txPr/>
-    <dgm:style>
-      <a:lnRef idx="2">
-        <a:scrgbClr r="0" g="0" b="0"/>
-      </a:lnRef>
-      <a:fillRef idx="1">
-        <a:scrgbClr r="0" g="0" b="0"/>
-      </a:fillRef>
-      <a:effectRef idx="0">
-        <a:scrgbClr r="0" g="0" b="0"/>
-      </a:effectRef>
-      <a:fontRef idx="minor"/>
-    </dgm:style>
-  </dgm:styleLbl>
-  <dgm:styleLbl name="alignAccFollowNode1">
-    <dgm:scene3d>
-      <a:camera prst="orthographicFront"/>
-      <a:lightRig rig="threePt" dir="t"/>
-    </dgm:scene3d>
-    <dgm:sp3d/>
-    <dgm:txPr/>
-    <dgm:style>
-      <a:lnRef idx="2">
-        <a:scrgbClr r="0" g="0" b="0"/>
-      </a:lnRef>
-      <a:fillRef idx="1">
-        <a:scrgbClr r="0" g="0" b="0"/>
-      </a:fillRef>
-      <a:effectRef idx="0">
-        <a:scrgbClr r="0" g="0" b="0"/>
-      </a:effectRef>
-      <a:fontRef idx="minor"/>
-    </dgm:style>
-  </dgm:styleLbl>
-  <dgm:styleLbl name="bgAccFollowNode1">
-    <dgm:scene3d>
-      <a:camera prst="orthographicFront"/>
-      <a:lightRig rig="threePt" dir="t"/>
-    </dgm:scene3d>
-    <dgm:sp3d/>
-    <dgm:txPr/>
-    <dgm:style>
-      <a:lnRef idx="2">
-        <a:scrgbClr r="0" g="0" b="0"/>
-      </a:lnRef>
-      <a:fillRef idx="1">
-        <a:scrgbClr r="0" g="0" b="0"/>
-      </a:fillRef>
-      <a:effectRef idx="0">
-        <a:scrgbClr r="0" g="0" b="0"/>
-      </a:effectRef>
-      <a:fontRef idx="minor"/>
-    </dgm:style>
-  </dgm:styleLbl>
-  <dgm:styleLbl name="fgAcc0">
-    <dgm:scene3d>
-      <a:camera prst="orthographicFront"/>
-      <a:lightRig rig="threePt" dir="t"/>
-    </dgm:scene3d>
-    <dgm:sp3d/>
-    <dgm:txPr/>
-    <dgm:style>
-      <a:lnRef idx="2">
-        <a:scrgbClr r="0" g="0" b="0"/>
-      </a:lnRef>
-      <a:fillRef idx="1">
-        <a:scrgbClr r="0" g="0" b="0"/>
-      </a:fillRef>
-      <a:effectRef idx="0">
-        <a:scrgbClr r="0" g="0" b="0"/>
-      </a:effectRef>
-      <a:fontRef idx="minor"/>
-    </dgm:style>
-  </dgm:styleLbl>
-  <dgm:styleLbl name="fgAcc2">
-    <dgm:scene3d>
-      <a:camera prst="orthographicFront"/>
-      <a:lightRig rig="threePt" dir="t"/>
-    </dgm:scene3d>
-    <dgm:sp3d/>
-    <dgm:txPr/>
-    <dgm:style>
-      <a:lnRef idx="2">
-        <a:scrgbClr r="0" g="0" b="0"/>
-      </a:lnRef>
-      <a:fillRef idx="1">
-        <a:scrgbClr r="0" g="0" b="0"/>
-      </a:fillRef>
-      <a:effectRef idx="0">
-        <a:scrgbClr r="0" g="0" b="0"/>
-      </a:effectRef>
-      <a:fontRef idx="minor"/>
-    </dgm:style>
-  </dgm:styleLbl>
-  <dgm:styleLbl name="fgAcc3">
-    <dgm:scene3d>
-      <a:camera prst="orthographicFront"/>
-      <a:lightRig rig="threePt" dir="t"/>
-    </dgm:scene3d>
-    <dgm:sp3d/>
-    <dgm:txPr/>
-    <dgm:style>
-      <a:lnRef idx="2">
-        <a:scrgbClr r="0" g="0" b="0"/>
-      </a:lnRef>
-      <a:fillRef idx="1">
-        <a:scrgbClr r="0" g="0" b="0"/>
-      </a:fillRef>
-      <a:effectRef idx="0">
-        <a:scrgbClr r="0" g="0" b="0"/>
-      </a:effectRef>
-      <a:fontRef idx="minor"/>
-    </dgm:style>
-  </dgm:styleLbl>
-  <dgm:styleLbl name="fgAcc4">
-    <dgm:scene3d>
-      <a:camera prst="orthographicFront"/>
-      <a:lightRig rig="threePt" dir="t"/>
-    </dgm:scene3d>
-    <dgm:sp3d/>
-    <dgm:txPr/>
-    <dgm:style>
-      <a:lnRef idx="2">
-        <a:scrgbClr r="0" g="0" b="0"/>
-      </a:lnRef>
-      <a:fillRef idx="1">
-        <a:scrgbClr r="0" g="0" b="0"/>
-      </a:fillRef>
-      <a:effectRef idx="0">
-        <a:scrgbClr r="0" g="0" b="0"/>
-      </a:effectRef>
-      <a:fontRef idx="minor"/>
-    </dgm:style>
-  </dgm:styleLbl>
-  <dgm:styleLbl name="bgShp">
-    <dgm:scene3d>
-      <a:camera prst="orthographicFront"/>
-      <a:lightRig rig="threePt" dir="t"/>
-    </dgm:scene3d>
-    <dgm:sp3d/>
-    <dgm:txPr/>
-    <dgm:style>
-      <a:lnRef idx="0">
-        <a:scrgbClr r="0" g="0" b="0"/>
-      </a:lnRef>
-      <a:fillRef idx="1">
-        <a:scrgbClr r="0" g="0" b="0"/>
-      </a:fillRef>
-      <a:effectRef idx="0">
-        <a:scrgbClr r="0" g="0" b="0"/>
-      </a:effectRef>
-      <a:fontRef idx="minor"/>
-    </dgm:style>
-  </dgm:styleLbl>
-  <dgm:styleLbl name="dkBgShp">
-    <dgm:scene3d>
-      <a:camera prst="orthographicFront"/>
-      <a:lightRig rig="threePt" dir="t"/>
-    </dgm:scene3d>
-    <dgm:sp3d/>
-    <dgm:txPr/>
-    <dgm:style>
-      <a:lnRef idx="0">
-        <a:scrgbClr r="0" g="0" b="0"/>
-      </a:lnRef>
-      <a:fillRef idx="1">
-        <a:scrgbClr r="0" g="0" b="0"/>
-      </a:fillRef>
-      <a:effectRef idx="0">
-        <a:scrgbClr r="0" g="0" b="0"/>
-      </a:effectRef>
-      <a:fontRef idx="minor"/>
-    </dgm:style>
-  </dgm:styleLbl>
-  <dgm:styleLbl name="trBgShp">
-    <dgm:scene3d>
-      <a:camera prst="orthographicFront"/>
-      <a:lightRig rig="threePt" dir="t"/>
-    </dgm:scene3d>
-    <dgm:sp3d/>
-    <dgm:txPr/>
-    <dgm:style>
-      <a:lnRef idx="0">
-        <a:scrgbClr r="0" g="0" b="0"/>
-      </a:lnRef>
-      <a:fillRef idx="1">
-        <a:scrgbClr r="0" g="0" b="0"/>
-      </a:fillRef>
-      <a:effectRef idx="0">
-        <a:scrgbClr r="0" g="0" b="0"/>
-      </a:effectRef>
-      <a:fontRef idx="minor"/>
-    </dgm:style>
-  </dgm:styleLbl>
-  <dgm:styleLbl name="fgShp">
-    <dgm:scene3d>
-      <a:camera prst="orthographicFront"/>
-      <a:lightRig rig="threePt" dir="t"/>
-    </dgm:scene3d>
-    <dgm:sp3d/>
-    <dgm:txPr/>
-    <dgm:style>
-      <a:lnRef idx="2">
-        <a:scrgbClr r="0" g="0" b="0"/>
-      </a:lnRef>
-      <a:fillRef idx="1">
-        <a:scrgbClr r="0" g="0" b="0"/>
-      </a:fillRef>
-      <a:effectRef idx="0">
-        <a:scrgbClr r="0" g="0" b="0"/>
-      </a:effectRef>
-      <a:fontRef idx="minor"/>
-    </dgm:style>
-  </dgm:styleLbl>
-  <dgm:styleLbl name="revTx">
-    <dgm:scene3d>
-      <a:camera prst="orthographicFront"/>
-      <a:lightRig rig="threePt" dir="t"/>
-    </dgm:scene3d>
-    <dgm:sp3d/>
-    <dgm:txPr/>
-    <dgm:style>
-      <a:lnRef idx="0">
-        <a:scrgbClr r="0" g="0" b="0"/>
-      </a:lnRef>
-      <a:fillRef idx="0">
-        <a:scrgbClr r="0" g="0" b="0"/>
-      </a:fillRef>
-      <a:effectRef idx="0">
-        <a:scrgbClr r="0" g="0" b="0"/>
-      </a:effectRef>
-      <a:fontRef idx="minor"/>
-    </dgm:style>
-  </dgm:styleLbl>
-</dgm:styleDef>
-</file>
-
 <file path=ppt/slideLayouts/slideLayout1.xml><?xml version="1.0" encoding="utf-8"?>
 <p:sldLayout xmlns:a="http://schemas.openxmlformats.org/drawingml/2006/main" xmlns:r="http://schemas.openxmlformats.org/officeDocument/2006/relationships" xmlns:p="http://schemas.openxmlformats.org/presentationml/2006/main" type="title" preserve="1">
   <p:cSld name="Slajd tytułowy">
@@ -2937,7 +263,7 @@
           <a:p>
             <a:fld id="{326D239A-5EC0-496A-9466-9F99847405E1}" type="datetimeFigureOut">
               <a:rPr lang="pl-PL" smtClean="0"/>
-              <a:t>05.10.2017</a:t>
+              <a:t>2019-03-22</a:t>
             </a:fld>
             <a:endParaRPr lang="pl-PL"/>
           </a:p>
@@ -3135,7 +461,7 @@
           <a:p>
             <a:fld id="{326D239A-5EC0-496A-9466-9F99847405E1}" type="datetimeFigureOut">
               <a:rPr lang="pl-PL" smtClean="0"/>
-              <a:t>05.10.2017</a:t>
+              <a:t>2019-03-22</a:t>
             </a:fld>
             <a:endParaRPr lang="pl-PL"/>
           </a:p>
@@ -3343,7 +669,7 @@
           <a:p>
             <a:fld id="{326D239A-5EC0-496A-9466-9F99847405E1}" type="datetimeFigureOut">
               <a:rPr lang="pl-PL" smtClean="0"/>
-              <a:t>05.10.2017</a:t>
+              <a:t>2019-03-22</a:t>
             </a:fld>
             <a:endParaRPr lang="pl-PL"/>
           </a:p>
@@ -3541,7 +867,7 @@
           <a:p>
             <a:fld id="{326D239A-5EC0-496A-9466-9F99847405E1}" type="datetimeFigureOut">
               <a:rPr lang="pl-PL" smtClean="0"/>
-              <a:t>05.10.2017</a:t>
+              <a:t>2019-03-22</a:t>
             </a:fld>
             <a:endParaRPr lang="pl-PL"/>
           </a:p>
@@ -3816,7 +1142,7 @@
           <a:p>
             <a:fld id="{326D239A-5EC0-496A-9466-9F99847405E1}" type="datetimeFigureOut">
               <a:rPr lang="pl-PL" smtClean="0"/>
-              <a:t>05.10.2017</a:t>
+              <a:t>2019-03-22</a:t>
             </a:fld>
             <a:endParaRPr lang="pl-PL"/>
           </a:p>
@@ -4081,7 +1407,7 @@
           <a:p>
             <a:fld id="{326D239A-5EC0-496A-9466-9F99847405E1}" type="datetimeFigureOut">
               <a:rPr lang="pl-PL" smtClean="0"/>
-              <a:t>05.10.2017</a:t>
+              <a:t>2019-03-22</a:t>
             </a:fld>
             <a:endParaRPr lang="pl-PL"/>
           </a:p>
@@ -4493,7 +1819,7 @@
           <a:p>
             <a:fld id="{326D239A-5EC0-496A-9466-9F99847405E1}" type="datetimeFigureOut">
               <a:rPr lang="pl-PL" smtClean="0"/>
-              <a:t>05.10.2017</a:t>
+              <a:t>2019-03-22</a:t>
             </a:fld>
             <a:endParaRPr lang="pl-PL"/>
           </a:p>
@@ -4634,7 +1960,7 @@
           <a:p>
             <a:fld id="{326D239A-5EC0-496A-9466-9F99847405E1}" type="datetimeFigureOut">
               <a:rPr lang="pl-PL" smtClean="0"/>
-              <a:t>05.10.2017</a:t>
+              <a:t>2019-03-22</a:t>
             </a:fld>
             <a:endParaRPr lang="pl-PL"/>
           </a:p>
@@ -4747,7 +2073,7 @@
           <a:p>
             <a:fld id="{326D239A-5EC0-496A-9466-9F99847405E1}" type="datetimeFigureOut">
               <a:rPr lang="pl-PL" smtClean="0"/>
-              <a:t>05.10.2017</a:t>
+              <a:t>2019-03-22</a:t>
             </a:fld>
             <a:endParaRPr lang="pl-PL"/>
           </a:p>
@@ -5058,7 +2384,7 @@
           <a:p>
             <a:fld id="{326D239A-5EC0-496A-9466-9F99847405E1}" type="datetimeFigureOut">
               <a:rPr lang="pl-PL" smtClean="0"/>
-              <a:t>05.10.2017</a:t>
+              <a:t>2019-03-22</a:t>
             </a:fld>
             <a:endParaRPr lang="pl-PL"/>
           </a:p>
@@ -5346,7 +2672,7 @@
           <a:p>
             <a:fld id="{326D239A-5EC0-496A-9466-9F99847405E1}" type="datetimeFigureOut">
               <a:rPr lang="pl-PL" smtClean="0"/>
-              <a:t>05.10.2017</a:t>
+              <a:t>2019-03-22</a:t>
             </a:fld>
             <a:endParaRPr lang="pl-PL"/>
           </a:p>
@@ -5587,7 +2913,7 @@
           <a:p>
             <a:fld id="{326D239A-5EC0-496A-9466-9F99847405E1}" type="datetimeFigureOut">
               <a:rPr lang="pl-PL" smtClean="0"/>
-              <a:t>05.10.2017</a:t>
+              <a:t>2019-03-22</a:t>
             </a:fld>
             <a:endParaRPr lang="pl-PL"/>
           </a:p>
@@ -6004,34 +3330,708 @@
           <a:chExt cx="0" cy="0"/>
         </a:xfrm>
       </p:grpSpPr>
-      <p:graphicFrame>
-        <p:nvGraphicFramePr>
-          <p:cNvPr id="4" name="Diagram 3">
-            <a:extLst>
-              <a:ext uri="{FF2B5EF4-FFF2-40B4-BE49-F238E27FC236}">
-                <a16:creationId xmlns:a16="http://schemas.microsoft.com/office/drawing/2014/main" id="{3F0D39C3-EFCB-4B2F-8C7B-BB4E0EA0DDD2}"/>
-              </a:ext>
-            </a:extLst>
-          </p:cNvPr>
-          <p:cNvGraphicFramePr/>
-          <p:nvPr>
-            <p:extLst>
-              <p:ext uri="{D42A27DB-BD31-4B8C-83A1-F6EECF244321}">
-                <p14:modId xmlns:p14="http://schemas.microsoft.com/office/powerpoint/2010/main" val="2634304752"/>
-              </p:ext>
-            </p:extLst>
-          </p:nvPr>
-        </p:nvGraphicFramePr>
-        <p:xfrm>
-          <a:off x="2032000" y="719666"/>
-          <a:ext cx="8128000" cy="5418667"/>
-        </p:xfrm>
-        <a:graphic>
-          <a:graphicData uri="http://schemas.openxmlformats.org/drawingml/2006/diagram">
-            <dgm:relIds xmlns:dgm="http://schemas.openxmlformats.org/drawingml/2006/diagram" xmlns:r="http://schemas.openxmlformats.org/officeDocument/2006/relationships" r:dm="rId2" r:lo="rId3" r:qs="rId4" r:cs="rId5"/>
-          </a:graphicData>
-        </a:graphic>
-      </p:graphicFrame>
+      <p:grpSp>
+        <p:nvGrpSpPr>
+          <p:cNvPr id="2" name="Group 1"/>
+          <p:cNvGrpSpPr/>
+          <p:nvPr/>
+        </p:nvGrpSpPr>
+        <p:grpSpPr>
+          <a:xfrm>
+            <a:off x="2032000" y="719666"/>
+            <a:ext cx="8128000" cy="5418666"/>
+            <a:chOff x="2032000" y="719666"/>
+            <a:chExt cx="8128000" cy="5418666"/>
+          </a:xfrm>
+        </p:grpSpPr>
+        <p:sp>
+          <p:nvSpPr>
+            <p:cNvPr id="3" name="Rounded Rectangle 2"/>
+            <p:cNvSpPr/>
+            <p:nvPr/>
+          </p:nvSpPr>
+          <p:spPr>
+            <a:xfrm>
+              <a:off x="2032000" y="719666"/>
+              <a:ext cx="8128000" cy="2438400"/>
+            </a:xfrm>
+            <a:prstGeom prst="roundRect">
+              <a:avLst>
+                <a:gd name="adj" fmla="val 10000"/>
+              </a:avLst>
+            </a:prstGeom>
+          </p:spPr>
+          <p:style>
+            <a:lnRef idx="2">
+              <a:schemeClr val="accent1">
+                <a:alpha val="90000"/>
+                <a:tint val="40000"/>
+                <a:hueOff val="0"/>
+                <a:satOff val="0"/>
+                <a:lumOff val="0"/>
+                <a:alphaOff val="0"/>
+              </a:schemeClr>
+            </a:lnRef>
+            <a:fillRef idx="1">
+              <a:schemeClr val="accent1">
+                <a:alpha val="90000"/>
+                <a:tint val="40000"/>
+                <a:hueOff val="0"/>
+                <a:satOff val="0"/>
+                <a:lumOff val="0"/>
+                <a:alphaOff val="0"/>
+              </a:schemeClr>
+            </a:fillRef>
+            <a:effectRef idx="0">
+              <a:schemeClr val="accent1">
+                <a:alpha val="90000"/>
+                <a:tint val="40000"/>
+                <a:hueOff val="0"/>
+                <a:satOff val="0"/>
+                <a:lumOff val="0"/>
+                <a:alphaOff val="0"/>
+              </a:schemeClr>
+            </a:effectRef>
+            <a:fontRef idx="minor">
+              <a:schemeClr val="dk1">
+                <a:hueOff val="0"/>
+                <a:satOff val="0"/>
+                <a:lumOff val="0"/>
+                <a:alphaOff val="0"/>
+              </a:schemeClr>
+            </a:fontRef>
+          </p:style>
+        </p:sp>
+        <p:sp>
+          <p:nvSpPr>
+            <p:cNvPr id="5" name="Rounded Rectangle 4"/>
+            <p:cNvSpPr/>
+            <p:nvPr/>
+          </p:nvSpPr>
+          <p:spPr>
+            <a:xfrm>
+              <a:off x="2275839" y="1044786"/>
+              <a:ext cx="2387600" cy="1788160"/>
+            </a:xfrm>
+            <a:prstGeom prst="roundRect">
+              <a:avLst>
+                <a:gd name="adj" fmla="val 10000"/>
+              </a:avLst>
+            </a:prstGeom>
+          </p:spPr>
+          <p:style>
+            <a:lnRef idx="2">
+              <a:schemeClr val="lt1">
+                <a:hueOff val="0"/>
+                <a:satOff val="0"/>
+                <a:lumOff val="0"/>
+                <a:alphaOff val="0"/>
+              </a:schemeClr>
+            </a:lnRef>
+            <a:fillRef idx="1">
+              <a:schemeClr val="accent1">
+                <a:tint val="50000"/>
+                <a:hueOff val="0"/>
+                <a:satOff val="0"/>
+                <a:lumOff val="0"/>
+                <a:alphaOff val="0"/>
+              </a:schemeClr>
+            </a:fillRef>
+            <a:effectRef idx="0">
+              <a:schemeClr val="accent1">
+                <a:tint val="50000"/>
+                <a:hueOff val="0"/>
+                <a:satOff val="0"/>
+                <a:lumOff val="0"/>
+                <a:alphaOff val="0"/>
+              </a:schemeClr>
+            </a:effectRef>
+            <a:fontRef idx="minor">
+              <a:schemeClr val="lt1">
+                <a:hueOff val="0"/>
+                <a:satOff val="0"/>
+                <a:lumOff val="0"/>
+                <a:alphaOff val="0"/>
+              </a:schemeClr>
+            </a:fontRef>
+          </p:style>
+        </p:sp>
+        <p:sp>
+          <p:nvSpPr>
+            <p:cNvPr id="6" name="Freeform 5"/>
+            <p:cNvSpPr/>
+            <p:nvPr/>
+          </p:nvSpPr>
+          <p:spPr>
+            <a:xfrm rot="10800000">
+              <a:off x="2275839" y="3158066"/>
+              <a:ext cx="2387600" cy="2980266"/>
+            </a:xfrm>
+            <a:custGeom>
+              <a:avLst/>
+              <a:gdLst>
+                <a:gd name="connsiteX0" fmla="*/ 250698 w 2387600"/>
+                <a:gd name="connsiteY0" fmla="*/ 0 h 2980266"/>
+                <a:gd name="connsiteX1" fmla="*/ 2136902 w 2387600"/>
+                <a:gd name="connsiteY1" fmla="*/ 0 h 2980266"/>
+                <a:gd name="connsiteX2" fmla="*/ 2387600 w 2387600"/>
+                <a:gd name="connsiteY2" fmla="*/ 250698 h 2980266"/>
+                <a:gd name="connsiteX3" fmla="*/ 2387600 w 2387600"/>
+                <a:gd name="connsiteY3" fmla="*/ 2980266 h 2980266"/>
+                <a:gd name="connsiteX4" fmla="*/ 2387600 w 2387600"/>
+                <a:gd name="connsiteY4" fmla="*/ 2980266 h 2980266"/>
+                <a:gd name="connsiteX5" fmla="*/ 0 w 2387600"/>
+                <a:gd name="connsiteY5" fmla="*/ 2980266 h 2980266"/>
+                <a:gd name="connsiteX6" fmla="*/ 0 w 2387600"/>
+                <a:gd name="connsiteY6" fmla="*/ 2980266 h 2980266"/>
+                <a:gd name="connsiteX7" fmla="*/ 0 w 2387600"/>
+                <a:gd name="connsiteY7" fmla="*/ 250698 h 2980266"/>
+                <a:gd name="connsiteX8" fmla="*/ 250698 w 2387600"/>
+                <a:gd name="connsiteY8" fmla="*/ 0 h 2980266"/>
+              </a:gdLst>
+              <a:ahLst/>
+              <a:cxnLst>
+                <a:cxn ang="0">
+                  <a:pos x="connsiteX0" y="connsiteY0"/>
+                </a:cxn>
+                <a:cxn ang="0">
+                  <a:pos x="connsiteX1" y="connsiteY1"/>
+                </a:cxn>
+                <a:cxn ang="0">
+                  <a:pos x="connsiteX2" y="connsiteY2"/>
+                </a:cxn>
+                <a:cxn ang="0">
+                  <a:pos x="connsiteX3" y="connsiteY3"/>
+                </a:cxn>
+                <a:cxn ang="0">
+                  <a:pos x="connsiteX4" y="connsiteY4"/>
+                </a:cxn>
+                <a:cxn ang="0">
+                  <a:pos x="connsiteX5" y="connsiteY5"/>
+                </a:cxn>
+                <a:cxn ang="0">
+                  <a:pos x="connsiteX6" y="connsiteY6"/>
+                </a:cxn>
+                <a:cxn ang="0">
+                  <a:pos x="connsiteX7" y="connsiteY7"/>
+                </a:cxn>
+                <a:cxn ang="0">
+                  <a:pos x="connsiteX8" y="connsiteY8"/>
+                </a:cxn>
+              </a:cxnLst>
+              <a:rect l="l" t="t" r="r" b="b"/>
+              <a:pathLst>
+                <a:path w="2387600" h="2980266">
+                  <a:moveTo>
+                    <a:pt x="2136902" y="2980266"/>
+                  </a:moveTo>
+                  <a:lnTo>
+                    <a:pt x="250698" y="2980266"/>
+                  </a:lnTo>
+                  <a:cubicBezTo>
+                    <a:pt x="112241" y="2980266"/>
+                    <a:pt x="0" y="2868025"/>
+                    <a:pt x="0" y="2729568"/>
+                  </a:cubicBezTo>
+                  <a:lnTo>
+                    <a:pt x="0" y="0"/>
+                  </a:lnTo>
+                  <a:lnTo>
+                    <a:pt x="0" y="0"/>
+                  </a:lnTo>
+                  <a:lnTo>
+                    <a:pt x="2387600" y="0"/>
+                  </a:lnTo>
+                  <a:lnTo>
+                    <a:pt x="2387600" y="0"/>
+                  </a:lnTo>
+                  <a:lnTo>
+                    <a:pt x="2387600" y="2729568"/>
+                  </a:lnTo>
+                  <a:cubicBezTo>
+                    <a:pt x="2387600" y="2868025"/>
+                    <a:pt x="2275359" y="2980266"/>
+                    <a:pt x="2136902" y="2980266"/>
+                  </a:cubicBezTo>
+                  <a:close/>
+                </a:path>
+              </a:pathLst>
+            </a:custGeom>
+          </p:spPr>
+          <p:style>
+            <a:lnRef idx="2">
+              <a:schemeClr val="lt1">
+                <a:hueOff val="0"/>
+                <a:satOff val="0"/>
+                <a:lumOff val="0"/>
+                <a:alphaOff val="0"/>
+              </a:schemeClr>
+            </a:lnRef>
+            <a:fillRef idx="1">
+              <a:schemeClr val="accent1">
+                <a:hueOff val="0"/>
+                <a:satOff val="0"/>
+                <a:lumOff val="0"/>
+                <a:alphaOff val="0"/>
+              </a:schemeClr>
+            </a:fillRef>
+            <a:effectRef idx="0">
+              <a:schemeClr val="accent1">
+                <a:hueOff val="0"/>
+                <a:satOff val="0"/>
+                <a:lumOff val="0"/>
+                <a:alphaOff val="0"/>
+              </a:schemeClr>
+            </a:effectRef>
+            <a:fontRef idx="minor">
+              <a:schemeClr val="lt1"/>
+            </a:fontRef>
+          </p:style>
+          <p:txBody>
+            <a:bodyPr spcFirstLastPara="0" vert="horz" wrap="square" lIns="329459" tIns="256032" rIns="329459" bIns="329459" numCol="1" spcCol="1270" anchor="t" anchorCtr="0">
+              <a:noAutofit/>
+            </a:bodyPr>
+            <a:lstStyle/>
+            <a:p>
+              <a:pPr lvl="0" algn="ctr" defTabSz="1600200">
+                <a:lnSpc>
+                  <a:spcPct val="90000"/>
+                </a:lnSpc>
+                <a:spcBef>
+                  <a:spcPct val="0"/>
+                </a:spcBef>
+                <a:spcAft>
+                  <a:spcPct val="35000"/>
+                </a:spcAft>
+              </a:pPr>
+              <a:r>
+                <a:rPr lang="pl-PL" sz="3600" kern="1200" dirty="0" err="1"/>
+                <a:t>Text</a:t>
+              </a:r>
+              <a:endParaRPr lang="pl-PL" sz="3600" kern="1200" dirty="0"/>
+            </a:p>
+          </p:txBody>
+        </p:sp>
+        <p:sp>
+          <p:nvSpPr>
+            <p:cNvPr id="7" name="Rounded Rectangle 6"/>
+            <p:cNvSpPr/>
+            <p:nvPr/>
+          </p:nvSpPr>
+          <p:spPr>
+            <a:xfrm>
+              <a:off x="4902200" y="1044786"/>
+              <a:ext cx="2387600" cy="1788160"/>
+            </a:xfrm>
+            <a:prstGeom prst="roundRect">
+              <a:avLst>
+                <a:gd name="adj" fmla="val 10000"/>
+              </a:avLst>
+            </a:prstGeom>
+          </p:spPr>
+          <p:style>
+            <a:lnRef idx="2">
+              <a:schemeClr val="lt1">
+                <a:hueOff val="0"/>
+                <a:satOff val="0"/>
+                <a:lumOff val="0"/>
+                <a:alphaOff val="0"/>
+              </a:schemeClr>
+            </a:lnRef>
+            <a:fillRef idx="1">
+              <a:schemeClr val="accent1">
+                <a:tint val="50000"/>
+                <a:hueOff val="0"/>
+                <a:satOff val="0"/>
+                <a:lumOff val="0"/>
+                <a:alphaOff val="0"/>
+              </a:schemeClr>
+            </a:fillRef>
+            <a:effectRef idx="0">
+              <a:schemeClr val="accent1">
+                <a:tint val="50000"/>
+                <a:hueOff val="0"/>
+                <a:satOff val="0"/>
+                <a:lumOff val="0"/>
+                <a:alphaOff val="0"/>
+              </a:schemeClr>
+            </a:effectRef>
+            <a:fontRef idx="minor">
+              <a:schemeClr val="lt1">
+                <a:hueOff val="0"/>
+                <a:satOff val="0"/>
+                <a:lumOff val="0"/>
+                <a:alphaOff val="0"/>
+              </a:schemeClr>
+            </a:fontRef>
+          </p:style>
+        </p:sp>
+        <p:sp>
+          <p:nvSpPr>
+            <p:cNvPr id="8" name="Freeform 7"/>
+            <p:cNvSpPr/>
+            <p:nvPr/>
+          </p:nvSpPr>
+          <p:spPr>
+            <a:xfrm rot="21600000">
+              <a:off x="4902200" y="3158065"/>
+              <a:ext cx="2387600" cy="2980267"/>
+            </a:xfrm>
+            <a:custGeom>
+              <a:avLst/>
+              <a:gdLst>
+                <a:gd name="connsiteX0" fmla="*/ 250698 w 2387600"/>
+                <a:gd name="connsiteY0" fmla="*/ 0 h 2980266"/>
+                <a:gd name="connsiteX1" fmla="*/ 2136902 w 2387600"/>
+                <a:gd name="connsiteY1" fmla="*/ 0 h 2980266"/>
+                <a:gd name="connsiteX2" fmla="*/ 2387600 w 2387600"/>
+                <a:gd name="connsiteY2" fmla="*/ 250698 h 2980266"/>
+                <a:gd name="connsiteX3" fmla="*/ 2387600 w 2387600"/>
+                <a:gd name="connsiteY3" fmla="*/ 2980266 h 2980266"/>
+                <a:gd name="connsiteX4" fmla="*/ 2387600 w 2387600"/>
+                <a:gd name="connsiteY4" fmla="*/ 2980266 h 2980266"/>
+                <a:gd name="connsiteX5" fmla="*/ 0 w 2387600"/>
+                <a:gd name="connsiteY5" fmla="*/ 2980266 h 2980266"/>
+                <a:gd name="connsiteX6" fmla="*/ 0 w 2387600"/>
+                <a:gd name="connsiteY6" fmla="*/ 2980266 h 2980266"/>
+                <a:gd name="connsiteX7" fmla="*/ 0 w 2387600"/>
+                <a:gd name="connsiteY7" fmla="*/ 250698 h 2980266"/>
+                <a:gd name="connsiteX8" fmla="*/ 250698 w 2387600"/>
+                <a:gd name="connsiteY8" fmla="*/ 0 h 2980266"/>
+              </a:gdLst>
+              <a:ahLst/>
+              <a:cxnLst>
+                <a:cxn ang="0">
+                  <a:pos x="connsiteX0" y="connsiteY0"/>
+                </a:cxn>
+                <a:cxn ang="0">
+                  <a:pos x="connsiteX1" y="connsiteY1"/>
+                </a:cxn>
+                <a:cxn ang="0">
+                  <a:pos x="connsiteX2" y="connsiteY2"/>
+                </a:cxn>
+                <a:cxn ang="0">
+                  <a:pos x="connsiteX3" y="connsiteY3"/>
+                </a:cxn>
+                <a:cxn ang="0">
+                  <a:pos x="connsiteX4" y="connsiteY4"/>
+                </a:cxn>
+                <a:cxn ang="0">
+                  <a:pos x="connsiteX5" y="connsiteY5"/>
+                </a:cxn>
+                <a:cxn ang="0">
+                  <a:pos x="connsiteX6" y="connsiteY6"/>
+                </a:cxn>
+                <a:cxn ang="0">
+                  <a:pos x="connsiteX7" y="connsiteY7"/>
+                </a:cxn>
+                <a:cxn ang="0">
+                  <a:pos x="connsiteX8" y="connsiteY8"/>
+                </a:cxn>
+              </a:cxnLst>
+              <a:rect l="l" t="t" r="r" b="b"/>
+              <a:pathLst>
+                <a:path w="2387600" h="2980266">
+                  <a:moveTo>
+                    <a:pt x="2136902" y="2980266"/>
+                  </a:moveTo>
+                  <a:lnTo>
+                    <a:pt x="250698" y="2980266"/>
+                  </a:lnTo>
+                  <a:cubicBezTo>
+                    <a:pt x="112241" y="2980266"/>
+                    <a:pt x="0" y="2868025"/>
+                    <a:pt x="0" y="2729568"/>
+                  </a:cubicBezTo>
+                  <a:lnTo>
+                    <a:pt x="0" y="0"/>
+                  </a:lnTo>
+                  <a:lnTo>
+                    <a:pt x="0" y="0"/>
+                  </a:lnTo>
+                  <a:lnTo>
+                    <a:pt x="2387600" y="0"/>
+                  </a:lnTo>
+                  <a:lnTo>
+                    <a:pt x="2387600" y="0"/>
+                  </a:lnTo>
+                  <a:lnTo>
+                    <a:pt x="2387600" y="2729568"/>
+                  </a:lnTo>
+                  <a:cubicBezTo>
+                    <a:pt x="2387600" y="2868025"/>
+                    <a:pt x="2275359" y="2980266"/>
+                    <a:pt x="2136902" y="2980266"/>
+                  </a:cubicBezTo>
+                  <a:close/>
+                </a:path>
+              </a:pathLst>
+            </a:custGeom>
+          </p:spPr>
+          <p:style>
+            <a:lnRef idx="2">
+              <a:schemeClr val="lt1">
+                <a:hueOff val="0"/>
+                <a:satOff val="0"/>
+                <a:lumOff val="0"/>
+                <a:alphaOff val="0"/>
+              </a:schemeClr>
+            </a:lnRef>
+            <a:fillRef idx="1">
+              <a:schemeClr val="accent1">
+                <a:hueOff val="0"/>
+                <a:satOff val="0"/>
+                <a:lumOff val="0"/>
+                <a:alphaOff val="0"/>
+              </a:schemeClr>
+            </a:fillRef>
+            <a:effectRef idx="0">
+              <a:schemeClr val="accent1">
+                <a:hueOff val="0"/>
+                <a:satOff val="0"/>
+                <a:lumOff val="0"/>
+                <a:alphaOff val="0"/>
+              </a:schemeClr>
+            </a:effectRef>
+            <a:fontRef idx="minor">
+              <a:schemeClr val="lt1"/>
+            </a:fontRef>
+          </p:style>
+          <p:txBody>
+            <a:bodyPr spcFirstLastPara="0" vert="horz" wrap="square" lIns="329459" tIns="256033" rIns="329459" bIns="329459" numCol="1" spcCol="1270" anchor="t" anchorCtr="0">
+              <a:noAutofit/>
+            </a:bodyPr>
+            <a:lstStyle/>
+            <a:p>
+              <a:pPr lvl="0" algn="ctr" defTabSz="1600200">
+                <a:lnSpc>
+                  <a:spcPct val="90000"/>
+                </a:lnSpc>
+                <a:spcBef>
+                  <a:spcPct val="0"/>
+                </a:spcBef>
+                <a:spcAft>
+                  <a:spcPct val="35000"/>
+                </a:spcAft>
+              </a:pPr>
+              <a:r>
+                <a:rPr lang="pl-PL" sz="3600" kern="1200" dirty="0"/>
+                <a:t>Was</a:t>
+              </a:r>
+            </a:p>
+          </p:txBody>
+        </p:sp>
+        <p:sp>
+          <p:nvSpPr>
+            <p:cNvPr id="9" name="Rounded Rectangle 8"/>
+            <p:cNvSpPr/>
+            <p:nvPr/>
+          </p:nvSpPr>
+          <p:spPr>
+            <a:xfrm>
+              <a:off x="7528559" y="1044786"/>
+              <a:ext cx="2387600" cy="1788160"/>
+            </a:xfrm>
+            <a:prstGeom prst="roundRect">
+              <a:avLst>
+                <a:gd name="adj" fmla="val 10000"/>
+              </a:avLst>
+            </a:prstGeom>
+          </p:spPr>
+          <p:style>
+            <a:lnRef idx="2">
+              <a:schemeClr val="lt1">
+                <a:hueOff val="0"/>
+                <a:satOff val="0"/>
+                <a:lumOff val="0"/>
+                <a:alphaOff val="0"/>
+              </a:schemeClr>
+            </a:lnRef>
+            <a:fillRef idx="1">
+              <a:schemeClr val="accent1">
+                <a:tint val="50000"/>
+                <a:hueOff val="0"/>
+                <a:satOff val="0"/>
+                <a:lumOff val="0"/>
+                <a:alphaOff val="0"/>
+              </a:schemeClr>
+            </a:fillRef>
+            <a:effectRef idx="0">
+              <a:schemeClr val="accent1">
+                <a:tint val="50000"/>
+                <a:hueOff val="0"/>
+                <a:satOff val="0"/>
+                <a:lumOff val="0"/>
+                <a:alphaOff val="0"/>
+              </a:schemeClr>
+            </a:effectRef>
+            <a:fontRef idx="minor">
+              <a:schemeClr val="lt1">
+                <a:hueOff val="0"/>
+                <a:satOff val="0"/>
+                <a:lumOff val="0"/>
+                <a:alphaOff val="0"/>
+              </a:schemeClr>
+            </a:fontRef>
+          </p:style>
+        </p:sp>
+        <p:sp>
+          <p:nvSpPr>
+            <p:cNvPr id="10" name="Freeform 9"/>
+            <p:cNvSpPr/>
+            <p:nvPr/>
+          </p:nvSpPr>
+          <p:spPr>
+            <a:xfrm rot="21600000">
+              <a:off x="7528559" y="3158066"/>
+              <a:ext cx="2387601" cy="2980266"/>
+            </a:xfrm>
+            <a:custGeom>
+              <a:avLst/>
+              <a:gdLst>
+                <a:gd name="connsiteX0" fmla="*/ 250698 w 2387600"/>
+                <a:gd name="connsiteY0" fmla="*/ 0 h 2980266"/>
+                <a:gd name="connsiteX1" fmla="*/ 2136902 w 2387600"/>
+                <a:gd name="connsiteY1" fmla="*/ 0 h 2980266"/>
+                <a:gd name="connsiteX2" fmla="*/ 2387600 w 2387600"/>
+                <a:gd name="connsiteY2" fmla="*/ 250698 h 2980266"/>
+                <a:gd name="connsiteX3" fmla="*/ 2387600 w 2387600"/>
+                <a:gd name="connsiteY3" fmla="*/ 2980266 h 2980266"/>
+                <a:gd name="connsiteX4" fmla="*/ 2387600 w 2387600"/>
+                <a:gd name="connsiteY4" fmla="*/ 2980266 h 2980266"/>
+                <a:gd name="connsiteX5" fmla="*/ 0 w 2387600"/>
+                <a:gd name="connsiteY5" fmla="*/ 2980266 h 2980266"/>
+                <a:gd name="connsiteX6" fmla="*/ 0 w 2387600"/>
+                <a:gd name="connsiteY6" fmla="*/ 2980266 h 2980266"/>
+                <a:gd name="connsiteX7" fmla="*/ 0 w 2387600"/>
+                <a:gd name="connsiteY7" fmla="*/ 250698 h 2980266"/>
+                <a:gd name="connsiteX8" fmla="*/ 250698 w 2387600"/>
+                <a:gd name="connsiteY8" fmla="*/ 0 h 2980266"/>
+              </a:gdLst>
+              <a:ahLst/>
+              <a:cxnLst>
+                <a:cxn ang="0">
+                  <a:pos x="connsiteX0" y="connsiteY0"/>
+                </a:cxn>
+                <a:cxn ang="0">
+                  <a:pos x="connsiteX1" y="connsiteY1"/>
+                </a:cxn>
+                <a:cxn ang="0">
+                  <a:pos x="connsiteX2" y="connsiteY2"/>
+                </a:cxn>
+                <a:cxn ang="0">
+                  <a:pos x="connsiteX3" y="connsiteY3"/>
+                </a:cxn>
+                <a:cxn ang="0">
+                  <a:pos x="connsiteX4" y="connsiteY4"/>
+                </a:cxn>
+                <a:cxn ang="0">
+                  <a:pos x="connsiteX5" y="connsiteY5"/>
+                </a:cxn>
+                <a:cxn ang="0">
+                  <a:pos x="connsiteX6" y="connsiteY6"/>
+                </a:cxn>
+                <a:cxn ang="0">
+                  <a:pos x="connsiteX7" y="connsiteY7"/>
+                </a:cxn>
+                <a:cxn ang="0">
+                  <a:pos x="connsiteX8" y="connsiteY8"/>
+                </a:cxn>
+              </a:cxnLst>
+              <a:rect l="l" t="t" r="r" b="b"/>
+              <a:pathLst>
+                <a:path w="2387600" h="2980266">
+                  <a:moveTo>
+                    <a:pt x="2136902" y="2980266"/>
+                  </a:moveTo>
+                  <a:lnTo>
+                    <a:pt x="250698" y="2980266"/>
+                  </a:lnTo>
+                  <a:cubicBezTo>
+                    <a:pt x="112241" y="2980266"/>
+                    <a:pt x="0" y="2868025"/>
+                    <a:pt x="0" y="2729568"/>
+                  </a:cubicBezTo>
+                  <a:lnTo>
+                    <a:pt x="0" y="0"/>
+                  </a:lnTo>
+                  <a:lnTo>
+                    <a:pt x="0" y="0"/>
+                  </a:lnTo>
+                  <a:lnTo>
+                    <a:pt x="2387600" y="0"/>
+                  </a:lnTo>
+                  <a:lnTo>
+                    <a:pt x="2387600" y="0"/>
+                  </a:lnTo>
+                  <a:lnTo>
+                    <a:pt x="2387600" y="2729568"/>
+                  </a:lnTo>
+                  <a:cubicBezTo>
+                    <a:pt x="2387600" y="2868025"/>
+                    <a:pt x="2275359" y="2980266"/>
+                    <a:pt x="2136902" y="2980266"/>
+                  </a:cubicBezTo>
+                  <a:close/>
+                </a:path>
+              </a:pathLst>
+            </a:custGeom>
+          </p:spPr>
+          <p:style>
+            <a:lnRef idx="2">
+              <a:schemeClr val="lt1">
+                <a:hueOff val="0"/>
+                <a:satOff val="0"/>
+                <a:lumOff val="0"/>
+                <a:alphaOff val="0"/>
+              </a:schemeClr>
+            </a:lnRef>
+            <a:fillRef idx="1">
+              <a:schemeClr val="accent1">
+                <a:hueOff val="0"/>
+                <a:satOff val="0"/>
+                <a:lumOff val="0"/>
+                <a:alphaOff val="0"/>
+              </a:schemeClr>
+            </a:fillRef>
+            <a:effectRef idx="0">
+              <a:schemeClr val="accent1">
+                <a:hueOff val="0"/>
+                <a:satOff val="0"/>
+                <a:lumOff val="0"/>
+                <a:alphaOff val="0"/>
+              </a:schemeClr>
+            </a:effectRef>
+            <a:fontRef idx="minor">
+              <a:schemeClr val="lt1"/>
+            </a:fontRef>
+          </p:style>
+          <p:txBody>
+            <a:bodyPr spcFirstLastPara="0" vert="horz" wrap="square" lIns="329459" tIns="256032" rIns="329460" bIns="329459" numCol="1" spcCol="1270" anchor="t" anchorCtr="0">
+              <a:noAutofit/>
+            </a:bodyPr>
+            <a:lstStyle/>
+            <a:p>
+              <a:pPr lvl="0" algn="ctr" defTabSz="1600200">
+                <a:lnSpc>
+                  <a:spcPct val="90000"/>
+                </a:lnSpc>
+                <a:spcBef>
+                  <a:spcPct val="0"/>
+                </a:spcBef>
+                <a:spcAft>
+                  <a:spcPct val="35000"/>
+                </a:spcAft>
+              </a:pPr>
+              <a:r>
+                <a:rPr lang="pl-PL" sz="3600" kern="1200" dirty="0" err="1"/>
+                <a:t>Mirrored</a:t>
+              </a:r>
+              <a:endParaRPr lang="pl-PL" sz="3600" kern="1200" dirty="0"/>
+            </a:p>
+          </p:txBody>
+        </p:sp>
+      </p:grpSp>
     </p:spTree>
     <p:extLst>
       <p:ext uri="{BB962C8B-B14F-4D97-AF65-F5344CB8AC3E}">

</xml_diff>